<commit_message>
add names and update book
</commit_message>
<xml_diff>
--- a/Capstone Project Phase A 24-1-D-11.pptx
+++ b/Capstone Project Phase A 24-1-D-11.pptx
@@ -5,7 +5,7 @@
     <p:sldMasterId id="2147483683" r:id="rId1"/>
   </p:sldMasterIdLst>
   <p:notesMasterIdLst>
-    <p:notesMasterId r:id="rId24"/>
+    <p:notesMasterId r:id="rId25"/>
   </p:notesMasterIdLst>
   <p:sldIdLst>
     <p:sldId id="256" r:id="rId2"/>
@@ -17,46 +17,47 @@
     <p:sldId id="323" r:id="rId8"/>
     <p:sldId id="324" r:id="rId9"/>
     <p:sldId id="332" r:id="rId10"/>
-    <p:sldId id="333" r:id="rId11"/>
-    <p:sldId id="334" r:id="rId12"/>
-    <p:sldId id="335" r:id="rId13"/>
-    <p:sldId id="329" r:id="rId14"/>
-    <p:sldId id="328" r:id="rId15"/>
-    <p:sldId id="325" r:id="rId16"/>
-    <p:sldId id="317" r:id="rId17"/>
-    <p:sldId id="321" r:id="rId18"/>
-    <p:sldId id="319" r:id="rId19"/>
-    <p:sldId id="320" r:id="rId20"/>
-    <p:sldId id="322" r:id="rId21"/>
-    <p:sldId id="327" r:id="rId22"/>
-    <p:sldId id="331" r:id="rId23"/>
+    <p:sldId id="336" r:id="rId11"/>
+    <p:sldId id="333" r:id="rId12"/>
+    <p:sldId id="334" r:id="rId13"/>
+    <p:sldId id="335" r:id="rId14"/>
+    <p:sldId id="329" r:id="rId15"/>
+    <p:sldId id="328" r:id="rId16"/>
+    <p:sldId id="325" r:id="rId17"/>
+    <p:sldId id="317" r:id="rId18"/>
+    <p:sldId id="321" r:id="rId19"/>
+    <p:sldId id="319" r:id="rId20"/>
+    <p:sldId id="320" r:id="rId21"/>
+    <p:sldId id="322" r:id="rId22"/>
+    <p:sldId id="327" r:id="rId23"/>
+    <p:sldId id="331" r:id="rId24"/>
   </p:sldIdLst>
   <p:sldSz cx="9144000" cy="5143500" type="screen16x9"/>
   <p:notesSz cx="6858000" cy="9144000"/>
   <p:embeddedFontLst>
     <p:embeddedFont>
       <p:font typeface="Montserrat" panose="00000500000000000000" pitchFamily="2" charset="0"/>
-      <p:regular r:id="rId25"/>
-      <p:bold r:id="rId26"/>
-      <p:italic r:id="rId27"/>
-      <p:boldItalic r:id="rId28"/>
+      <p:regular r:id="rId26"/>
+      <p:bold r:id="rId27"/>
+      <p:italic r:id="rId28"/>
+      <p:boldItalic r:id="rId29"/>
     </p:embeddedFont>
     <p:embeddedFont>
       <p:font typeface="Oswald" panose="00000500000000000000" pitchFamily="2" charset="0"/>
-      <p:regular r:id="rId29"/>
-      <p:bold r:id="rId30"/>
+      <p:regular r:id="rId30"/>
+      <p:bold r:id="rId31"/>
     </p:embeddedFont>
     <p:embeddedFont>
       <p:font typeface="Palanquin Dark" panose="020B0604020202020204" charset="0"/>
-      <p:regular r:id="rId31"/>
-      <p:bold r:id="rId32"/>
+      <p:regular r:id="rId32"/>
+      <p:bold r:id="rId33"/>
     </p:embeddedFont>
     <p:embeddedFont>
       <p:font typeface="Roboto" panose="02000000000000000000" pitchFamily="2" charset="0"/>
-      <p:regular r:id="rId33"/>
-      <p:bold r:id="rId34"/>
-      <p:italic r:id="rId35"/>
-      <p:boldItalic r:id="rId36"/>
+      <p:regular r:id="rId34"/>
+      <p:bold r:id="rId35"/>
+      <p:italic r:id="rId36"/>
+      <p:boldItalic r:id="rId37"/>
     </p:embeddedFont>
   </p:embeddedFontLst>
   <p:defaultTextStyle>
@@ -6485,6 +6486,75 @@
           <a:bodyPr/>
           <a:lstStyle/>
           <a:p>
+            <a:pPr marL="158750" indent="0">
+              <a:buNone/>
+            </a:pPr>
+            <a:endParaRPr lang="en-IL" dirty="0"/>
+          </a:p>
+        </p:txBody>
+      </p:sp>
+    </p:spTree>
+    <p:extLst>
+      <p:ext uri="{BB962C8B-B14F-4D97-AF65-F5344CB8AC3E}">
+        <p14:creationId xmlns:p14="http://schemas.microsoft.com/office/powerpoint/2010/main" val="3408754352"/>
+      </p:ext>
+    </p:extLst>
+  </p:cSld>
+  <p:clrMapOvr>
+    <a:masterClrMapping/>
+  </p:clrMapOvr>
+</p:notes>
+</file>
+
+<file path=ppt/notesSlides/notesSlide6.xml><?xml version="1.0" encoding="utf-8"?>
+<p:notes xmlns:a="http://schemas.openxmlformats.org/drawingml/2006/main" xmlns:r="http://schemas.openxmlformats.org/officeDocument/2006/relationships" xmlns:p="http://schemas.openxmlformats.org/presentationml/2006/main">
+  <p:cSld>
+    <p:spTree>
+      <p:nvGrpSpPr>
+        <p:cNvPr id="1" name=""/>
+        <p:cNvGrpSpPr/>
+        <p:nvPr/>
+      </p:nvGrpSpPr>
+      <p:grpSpPr>
+        <a:xfrm>
+          <a:off x="0" y="0"/>
+          <a:ext cx="0" cy="0"/>
+          <a:chOff x="0" y="0"/>
+          <a:chExt cx="0" cy="0"/>
+        </a:xfrm>
+      </p:grpSpPr>
+      <p:sp>
+        <p:nvSpPr>
+          <p:cNvPr id="2" name="Slide Image Placeholder 1"/>
+          <p:cNvSpPr>
+            <a:spLocks noGrp="1" noRot="1" noChangeAspect="1"/>
+          </p:cNvSpPr>
+          <p:nvPr>
+            <p:ph type="sldImg"/>
+          </p:nvPr>
+        </p:nvSpPr>
+        <p:spPr>
+          <a:xfrm>
+            <a:off x="381000" y="685800"/>
+            <a:ext cx="6096000" cy="3429000"/>
+          </a:xfrm>
+        </p:spPr>
+      </p:sp>
+      <p:sp>
+        <p:nvSpPr>
+          <p:cNvPr id="3" name="Notes Placeholder 2"/>
+          <p:cNvSpPr>
+            <a:spLocks noGrp="1"/>
+          </p:cNvSpPr>
+          <p:nvPr>
+            <p:ph type="body" idx="1"/>
+          </p:nvPr>
+        </p:nvSpPr>
+        <p:spPr/>
+        <p:txBody>
+          <a:bodyPr/>
+          <a:lstStyle/>
+          <a:p>
             <a:endParaRPr lang="en-IL" dirty="0"/>
           </a:p>
         </p:txBody>
@@ -6502,7 +6572,7 @@
 </p:notes>
 </file>
 
-<file path=ppt/notesSlides/notesSlide6.xml><?xml version="1.0" encoding="utf-8"?>
+<file path=ppt/notesSlides/notesSlide7.xml><?xml version="1.0" encoding="utf-8"?>
 <p:notes xmlns:a="http://schemas.openxmlformats.org/drawingml/2006/main" xmlns:r="http://schemas.openxmlformats.org/officeDocument/2006/relationships" xmlns:p="http://schemas.openxmlformats.org/presentationml/2006/main">
   <p:cSld>
     <p:spTree>
@@ -6649,7 +6719,7 @@
 </p:notes>
 </file>
 
-<file path=ppt/notesSlides/notesSlide7.xml><?xml version="1.0" encoding="utf-8"?>
+<file path=ppt/notesSlides/notesSlide8.xml><?xml version="1.0" encoding="utf-8"?>
 <p:notes xmlns:a="http://schemas.openxmlformats.org/drawingml/2006/main" xmlns:r="http://schemas.openxmlformats.org/officeDocument/2006/relationships" xmlns:p="http://schemas.openxmlformats.org/presentationml/2006/main">
   <p:cSld>
     <p:spTree>
@@ -6698,87 +6768,9 @@
           <a:bodyPr/>
           <a:lstStyle/>
           <a:p>
-            <a:r>
-              <a:rPr lang="en-US" dirty="0"/>
-              <a:t>Integration Complexity</a:t>
-            </a:r>
-          </a:p>
-          <a:p>
-            <a:pPr lvl="1"/>
-            <a:r>
-              <a:rPr lang="en-US" dirty="0"/>
-              <a:t>Combining ChatGPT with out custom systems.</a:t>
-            </a:r>
-          </a:p>
-          <a:p>
-            <a:pPr lvl="1"/>
-            <a:r>
-              <a:rPr lang="en-US" dirty="0"/>
-              <a:t>Ensuring seamless data flow between frontend, backend, and database.</a:t>
-            </a:r>
-          </a:p>
-          <a:p>
-            <a:pPr lvl="0"/>
-            <a:r>
-              <a:rPr lang="en-US" dirty="0"/>
-              <a:t>Accuracy and Reliability</a:t>
-            </a:r>
-          </a:p>
-          <a:p>
-            <a:pPr lvl="1"/>
-            <a:r>
-              <a:rPr lang="en-US" dirty="0"/>
-              <a:t>Maintaining high accuracy in language tasks generated by ChatGPT.</a:t>
-            </a:r>
-          </a:p>
-          <a:p>
-            <a:pPr lvl="1"/>
-            <a:r>
-              <a:rPr lang="en-US" dirty="0"/>
-              <a:t>Handling varied user inputs and providing relevant feedback.</a:t>
-            </a:r>
-          </a:p>
-          <a:p>
-            <a:pPr lvl="0"/>
-            <a:r>
-              <a:rPr lang="en-US" dirty="0"/>
-              <a:t>Scalability</a:t>
-            </a:r>
-          </a:p>
-          <a:p>
-            <a:pPr lvl="1"/>
-            <a:r>
-              <a:rPr lang="en-US" dirty="0"/>
-              <a:t>Designing the backend to handle many concurrent users.</a:t>
-            </a:r>
-          </a:p>
-          <a:p>
-            <a:pPr lvl="1"/>
-            <a:r>
-              <a:rPr lang="en-US" dirty="0"/>
-              <a:t>Scaling the system as user base and data volume grow.</a:t>
-            </a:r>
-          </a:p>
-          <a:p>
-            <a:pPr lvl="0"/>
-            <a:r>
-              <a:rPr lang="en-US" dirty="0"/>
-              <a:t>User Experience</a:t>
-            </a:r>
-          </a:p>
-          <a:p>
-            <a:pPr lvl="1"/>
-            <a:r>
-              <a:rPr lang="en-US" dirty="0"/>
-              <a:t>Creating an intuitive interface that accommodates diverse user groups.</a:t>
-            </a:r>
-          </a:p>
-          <a:p>
-            <a:pPr lvl="1"/>
-            <a:r>
-              <a:rPr lang="en-US" dirty="0"/>
-              <a:t>Ensuring quick response times and minimal downtimes.</a:t>
-            </a:r>
+            <a:pPr marL="158750" indent="0">
+              <a:buNone/>
+            </a:pPr>
             <a:endParaRPr lang="en-IL" dirty="0"/>
           </a:p>
         </p:txBody>
@@ -33266,7 +33258,7 @@
         </p:nvSpPr>
         <p:spPr>
           <a:xfrm>
-            <a:off x="705220" y="2692817"/>
+            <a:off x="344196" y="2683053"/>
             <a:ext cx="3791423" cy="2042742"/>
           </a:xfrm>
           <a:prstGeom prst="rect">
@@ -33279,7 +33271,7 @@
           </a:bodyPr>
           <a:lstStyle/>
           <a:p>
-            <a:pPr marL="0" lvl="0" indent="0" algn="l" rtl="0">
+            <a:pPr marL="0" lvl="0" indent="0" algn="ctr" rtl="0">
               <a:lnSpc>
                 <a:spcPts val="4575"/>
               </a:lnSpc>
@@ -33595,6 +33587,347 @@
           </a:prstGeom>
         </p:spPr>
       </p:pic>
+      <p:sp>
+        <p:nvSpPr>
+          <p:cNvPr id="2" name="Google Shape;703;p38">
+            <a:extLst>
+              <a:ext uri="{FF2B5EF4-FFF2-40B4-BE49-F238E27FC236}">
+                <a16:creationId xmlns:a16="http://schemas.microsoft.com/office/drawing/2014/main" id="{B5517B0B-359B-9352-739A-A12C0081C61F}"/>
+              </a:ext>
+            </a:extLst>
+          </p:cNvPr>
+          <p:cNvSpPr txBox="1">
+            <a:spLocks/>
+          </p:cNvSpPr>
+          <p:nvPr/>
+        </p:nvSpPr>
+        <p:spPr>
+          <a:xfrm>
+            <a:off x="5929918" y="4300894"/>
+            <a:ext cx="3496818" cy="812676"/>
+          </a:xfrm>
+          <a:prstGeom prst="rect">
+            <a:avLst/>
+          </a:prstGeom>
+          <a:noFill/>
+          <a:ln>
+            <a:noFill/>
+          </a:ln>
+        </p:spPr>
+        <p:txBody>
+          <a:bodyPr spcFirstLastPara="1" wrap="square" lIns="91425" tIns="91425" rIns="91425" bIns="91425" anchor="b" anchorCtr="0">
+            <a:noAutofit/>
+          </a:bodyPr>
+          <a:lstStyle>
+            <a:defPPr marR="0" lvl="0" algn="l" rtl="0">
+              <a:lnSpc>
+                <a:spcPct val="100000"/>
+              </a:lnSpc>
+              <a:spcBef>
+                <a:spcPts val="0"/>
+              </a:spcBef>
+              <a:spcAft>
+                <a:spcPts val="0"/>
+              </a:spcAft>
+            </a:defPPr>
+            <a:lvl1pPr marR="0" lvl="0" algn="l" rtl="0">
+              <a:lnSpc>
+                <a:spcPct val="100000"/>
+              </a:lnSpc>
+              <a:spcBef>
+                <a:spcPts val="0"/>
+              </a:spcBef>
+              <a:spcAft>
+                <a:spcPts val="0"/>
+              </a:spcAft>
+              <a:buClr>
+                <a:schemeClr val="dk1"/>
+              </a:buClr>
+              <a:buSzPts val="5000"/>
+              <a:buFont typeface="Oswald"/>
+              <a:buNone/>
+              <a:defRPr sz="5000" b="1" i="0" u="none" strike="noStrike" cap="none">
+                <a:solidFill>
+                  <a:schemeClr val="dk1"/>
+                </a:solidFill>
+                <a:latin typeface="Oswald"/>
+                <a:ea typeface="Oswald"/>
+                <a:cs typeface="Oswald"/>
+                <a:sym typeface="Oswald"/>
+              </a:defRPr>
+            </a:lvl1pPr>
+            <a:lvl2pPr marR="0" lvl="1" algn="l" rtl="0">
+              <a:lnSpc>
+                <a:spcPct val="100000"/>
+              </a:lnSpc>
+              <a:spcBef>
+                <a:spcPts val="0"/>
+              </a:spcBef>
+              <a:spcAft>
+                <a:spcPts val="0"/>
+              </a:spcAft>
+              <a:buClr>
+                <a:schemeClr val="dk1"/>
+              </a:buClr>
+              <a:buSzPts val="5200"/>
+              <a:buFont typeface="Oswald"/>
+              <a:buNone/>
+              <a:defRPr sz="5200" b="0" i="0" u="none" strike="noStrike" cap="none">
+                <a:solidFill>
+                  <a:schemeClr val="dk1"/>
+                </a:solidFill>
+                <a:latin typeface="Oswald"/>
+                <a:ea typeface="Oswald"/>
+                <a:cs typeface="Oswald"/>
+                <a:sym typeface="Oswald"/>
+              </a:defRPr>
+            </a:lvl2pPr>
+            <a:lvl3pPr marR="0" lvl="2" algn="l" rtl="0">
+              <a:lnSpc>
+                <a:spcPct val="100000"/>
+              </a:lnSpc>
+              <a:spcBef>
+                <a:spcPts val="0"/>
+              </a:spcBef>
+              <a:spcAft>
+                <a:spcPts val="0"/>
+              </a:spcAft>
+              <a:buClr>
+                <a:schemeClr val="dk1"/>
+              </a:buClr>
+              <a:buSzPts val="5200"/>
+              <a:buFont typeface="Oswald"/>
+              <a:buNone/>
+              <a:defRPr sz="5200" b="0" i="0" u="none" strike="noStrike" cap="none">
+                <a:solidFill>
+                  <a:schemeClr val="dk1"/>
+                </a:solidFill>
+                <a:latin typeface="Oswald"/>
+                <a:ea typeface="Oswald"/>
+                <a:cs typeface="Oswald"/>
+                <a:sym typeface="Oswald"/>
+              </a:defRPr>
+            </a:lvl3pPr>
+            <a:lvl4pPr marR="0" lvl="3" algn="l" rtl="0">
+              <a:lnSpc>
+                <a:spcPct val="100000"/>
+              </a:lnSpc>
+              <a:spcBef>
+                <a:spcPts val="0"/>
+              </a:spcBef>
+              <a:spcAft>
+                <a:spcPts val="0"/>
+              </a:spcAft>
+              <a:buClr>
+                <a:schemeClr val="dk1"/>
+              </a:buClr>
+              <a:buSzPts val="5200"/>
+              <a:buFont typeface="Oswald"/>
+              <a:buNone/>
+              <a:defRPr sz="5200" b="0" i="0" u="none" strike="noStrike" cap="none">
+                <a:solidFill>
+                  <a:schemeClr val="dk1"/>
+                </a:solidFill>
+                <a:latin typeface="Oswald"/>
+                <a:ea typeface="Oswald"/>
+                <a:cs typeface="Oswald"/>
+                <a:sym typeface="Oswald"/>
+              </a:defRPr>
+            </a:lvl4pPr>
+            <a:lvl5pPr marR="0" lvl="4" algn="l" rtl="0">
+              <a:lnSpc>
+                <a:spcPct val="100000"/>
+              </a:lnSpc>
+              <a:spcBef>
+                <a:spcPts val="0"/>
+              </a:spcBef>
+              <a:spcAft>
+                <a:spcPts val="0"/>
+              </a:spcAft>
+              <a:buClr>
+                <a:schemeClr val="dk1"/>
+              </a:buClr>
+              <a:buSzPts val="5200"/>
+              <a:buFont typeface="Oswald"/>
+              <a:buNone/>
+              <a:defRPr sz="5200" b="0" i="0" u="none" strike="noStrike" cap="none">
+                <a:solidFill>
+                  <a:schemeClr val="dk1"/>
+                </a:solidFill>
+                <a:latin typeface="Oswald"/>
+                <a:ea typeface="Oswald"/>
+                <a:cs typeface="Oswald"/>
+                <a:sym typeface="Oswald"/>
+              </a:defRPr>
+            </a:lvl5pPr>
+            <a:lvl6pPr marR="0" lvl="5" algn="l" rtl="0">
+              <a:lnSpc>
+                <a:spcPct val="100000"/>
+              </a:lnSpc>
+              <a:spcBef>
+                <a:spcPts val="0"/>
+              </a:spcBef>
+              <a:spcAft>
+                <a:spcPts val="0"/>
+              </a:spcAft>
+              <a:buClr>
+                <a:schemeClr val="dk1"/>
+              </a:buClr>
+              <a:buSzPts val="5200"/>
+              <a:buFont typeface="Oswald"/>
+              <a:buNone/>
+              <a:defRPr sz="5200" b="0" i="0" u="none" strike="noStrike" cap="none">
+                <a:solidFill>
+                  <a:schemeClr val="dk1"/>
+                </a:solidFill>
+                <a:latin typeface="Oswald"/>
+                <a:ea typeface="Oswald"/>
+                <a:cs typeface="Oswald"/>
+                <a:sym typeface="Oswald"/>
+              </a:defRPr>
+            </a:lvl6pPr>
+            <a:lvl7pPr marR="0" lvl="6" algn="l" rtl="0">
+              <a:lnSpc>
+                <a:spcPct val="100000"/>
+              </a:lnSpc>
+              <a:spcBef>
+                <a:spcPts val="0"/>
+              </a:spcBef>
+              <a:spcAft>
+                <a:spcPts val="0"/>
+              </a:spcAft>
+              <a:buClr>
+                <a:schemeClr val="dk1"/>
+              </a:buClr>
+              <a:buSzPts val="5200"/>
+              <a:buFont typeface="Oswald"/>
+              <a:buNone/>
+              <a:defRPr sz="5200" b="0" i="0" u="none" strike="noStrike" cap="none">
+                <a:solidFill>
+                  <a:schemeClr val="dk1"/>
+                </a:solidFill>
+                <a:latin typeface="Oswald"/>
+                <a:ea typeface="Oswald"/>
+                <a:cs typeface="Oswald"/>
+                <a:sym typeface="Oswald"/>
+              </a:defRPr>
+            </a:lvl7pPr>
+            <a:lvl8pPr marR="0" lvl="7" algn="l" rtl="0">
+              <a:lnSpc>
+                <a:spcPct val="100000"/>
+              </a:lnSpc>
+              <a:spcBef>
+                <a:spcPts val="0"/>
+              </a:spcBef>
+              <a:spcAft>
+                <a:spcPts val="0"/>
+              </a:spcAft>
+              <a:buClr>
+                <a:schemeClr val="dk1"/>
+              </a:buClr>
+              <a:buSzPts val="5200"/>
+              <a:buFont typeface="Oswald"/>
+              <a:buNone/>
+              <a:defRPr sz="5200" b="0" i="0" u="none" strike="noStrike" cap="none">
+                <a:solidFill>
+                  <a:schemeClr val="dk1"/>
+                </a:solidFill>
+                <a:latin typeface="Oswald"/>
+                <a:ea typeface="Oswald"/>
+                <a:cs typeface="Oswald"/>
+                <a:sym typeface="Oswald"/>
+              </a:defRPr>
+            </a:lvl8pPr>
+            <a:lvl9pPr marR="0" lvl="8" algn="l" rtl="0">
+              <a:lnSpc>
+                <a:spcPct val="100000"/>
+              </a:lnSpc>
+              <a:spcBef>
+                <a:spcPts val="0"/>
+              </a:spcBef>
+              <a:spcAft>
+                <a:spcPts val="0"/>
+              </a:spcAft>
+              <a:buClr>
+                <a:schemeClr val="dk1"/>
+              </a:buClr>
+              <a:buSzPts val="5200"/>
+              <a:buFont typeface="Oswald"/>
+              <a:buNone/>
+              <a:defRPr sz="5200" b="0" i="0" u="none" strike="noStrike" cap="none">
+                <a:solidFill>
+                  <a:schemeClr val="dk1"/>
+                </a:solidFill>
+                <a:latin typeface="Oswald"/>
+                <a:ea typeface="Oswald"/>
+                <a:cs typeface="Oswald"/>
+                <a:sym typeface="Oswald"/>
+              </a:defRPr>
+            </a:lvl9pPr>
+          </a:lstStyle>
+          <a:p>
+            <a:r>
+              <a:rPr lang="en-US" sz="1200" dirty="0">
+                <a:latin typeface="Montserrat" panose="00000500000000000000" pitchFamily="2" charset="0"/>
+              </a:rPr>
+              <a:t>Supervisor: </a:t>
+            </a:r>
+            <a:r>
+              <a:rPr lang="en-US" sz="1200" b="0" dirty="0">
+                <a:latin typeface="Montserrat" panose="00000500000000000000" pitchFamily="2" charset="0"/>
+              </a:rPr>
+              <a:t>Mr. Alex Keselman</a:t>
+            </a:r>
+            <a:br>
+              <a:rPr lang="en-US" sz="1200" b="0" dirty="0">
+                <a:latin typeface="Montserrat" panose="00000500000000000000" pitchFamily="2" charset="0"/>
+              </a:rPr>
+            </a:br>
+            <a:r>
+              <a:rPr lang="en-US" sz="1200" dirty="0">
+                <a:latin typeface="Montserrat" panose="00000500000000000000" pitchFamily="2" charset="0"/>
+              </a:rPr>
+              <a:t>Students: </a:t>
+            </a:r>
+            <a:r>
+              <a:rPr lang="en-US" sz="1200" b="0" dirty="0">
+                <a:latin typeface="Montserrat" panose="00000500000000000000" pitchFamily="2" charset="0"/>
+              </a:rPr>
+              <a:t>Oneill Panker &amp; Roman Gury</a:t>
+            </a:r>
+          </a:p>
+        </p:txBody>
+      </p:sp>
+      <p:pic>
+        <p:nvPicPr>
+          <p:cNvPr id="7" name="Picture 6" descr="A blue and black logo&#10;&#10;Description automatically generated">
+            <a:extLst>
+              <a:ext uri="{FF2B5EF4-FFF2-40B4-BE49-F238E27FC236}">
+                <a16:creationId xmlns:a16="http://schemas.microsoft.com/office/drawing/2014/main" id="{3CEA4B95-B1C7-A56B-AC7D-1044AA6A224E}"/>
+              </a:ext>
+            </a:extLst>
+          </p:cNvPr>
+          <p:cNvPicPr>
+            <a:picLocks noChangeAspect="1"/>
+          </p:cNvPicPr>
+          <p:nvPr/>
+        </p:nvPicPr>
+        <p:blipFill>
+          <a:blip r:embed="rId4"/>
+          <a:stretch>
+            <a:fillRect/>
+          </a:stretch>
+        </p:blipFill>
+        <p:spPr>
+          <a:xfrm>
+            <a:off x="6915150" y="13559"/>
+            <a:ext cx="2265652" cy="534820"/>
+          </a:xfrm>
+          <a:prstGeom prst="rect">
+            <a:avLst/>
+          </a:prstGeom>
+        </p:spPr>
+      </p:pic>
     </p:spTree>
   </p:cSld>
   <p:clrMapOvr>
@@ -33604,6 +33937,397 @@
 </file>
 
 <file path=ppt/slides/slide10.xml><?xml version="1.0" encoding="utf-8"?>
+<p:sld xmlns:a="http://schemas.openxmlformats.org/drawingml/2006/main" xmlns:r="http://schemas.openxmlformats.org/officeDocument/2006/relationships" xmlns:p="http://schemas.openxmlformats.org/presentationml/2006/main">
+  <p:cSld>
+    <p:spTree>
+      <p:nvGrpSpPr>
+        <p:cNvPr id="1" name=""/>
+        <p:cNvGrpSpPr/>
+        <p:nvPr/>
+      </p:nvGrpSpPr>
+      <p:grpSpPr>
+        <a:xfrm>
+          <a:off x="0" y="0"/>
+          <a:ext cx="0" cy="0"/>
+          <a:chOff x="0" y="0"/>
+          <a:chExt cx="0" cy="0"/>
+        </a:xfrm>
+      </p:grpSpPr>
+      <p:sp>
+        <p:nvSpPr>
+          <p:cNvPr id="4" name="Title 1">
+            <a:extLst>
+              <a:ext uri="{FF2B5EF4-FFF2-40B4-BE49-F238E27FC236}">
+                <a16:creationId xmlns:a16="http://schemas.microsoft.com/office/drawing/2014/main" id="{A49E0346-2826-BF43-14EA-28EB76EB1639}"/>
+              </a:ext>
+            </a:extLst>
+          </p:cNvPr>
+          <p:cNvSpPr>
+            <a:spLocks noGrp="1"/>
+          </p:cNvSpPr>
+          <p:nvPr>
+            <p:ph type="title"/>
+          </p:nvPr>
+        </p:nvSpPr>
+        <p:spPr>
+          <a:xfrm>
+            <a:off x="720000" y="387600"/>
+            <a:ext cx="7704000" cy="612600"/>
+          </a:xfrm>
+        </p:spPr>
+        <p:txBody>
+          <a:bodyPr/>
+          <a:lstStyle/>
+          <a:p>
+            <a:r>
+              <a:rPr lang="en-US" sz="3600" dirty="0"/>
+              <a:t>ChatGPT Prompts</a:t>
+            </a:r>
+          </a:p>
+        </p:txBody>
+      </p:sp>
+      <p:sp>
+        <p:nvSpPr>
+          <p:cNvPr id="5" name="Subtitle 13">
+            <a:extLst>
+              <a:ext uri="{FF2B5EF4-FFF2-40B4-BE49-F238E27FC236}">
+                <a16:creationId xmlns:a16="http://schemas.microsoft.com/office/drawing/2014/main" id="{C97B49BC-0C5B-B6E0-27B6-D75461D4E7DD}"/>
+              </a:ext>
+            </a:extLst>
+          </p:cNvPr>
+          <p:cNvSpPr txBox="1">
+            <a:spLocks/>
+          </p:cNvSpPr>
+          <p:nvPr/>
+        </p:nvSpPr>
+        <p:spPr>
+          <a:xfrm>
+            <a:off x="720000" y="1200289"/>
+            <a:ext cx="4935924" cy="3346025"/>
+          </a:xfrm>
+          <a:prstGeom prst="rect">
+            <a:avLst/>
+          </a:prstGeom>
+        </p:spPr>
+        <p:txBody>
+          <a:bodyPr/>
+          <a:lstStyle>
+            <a:defPPr marR="0" lvl="0" algn="l" rtl="0">
+              <a:lnSpc>
+                <a:spcPct val="100000"/>
+              </a:lnSpc>
+              <a:spcBef>
+                <a:spcPts val="0"/>
+              </a:spcBef>
+              <a:spcAft>
+                <a:spcPts val="0"/>
+              </a:spcAft>
+            </a:defPPr>
+            <a:lvl1pPr marR="0" lvl="0" algn="l" rtl="0">
+              <a:lnSpc>
+                <a:spcPct val="100000"/>
+              </a:lnSpc>
+              <a:spcBef>
+                <a:spcPts val="0"/>
+              </a:spcBef>
+              <a:spcAft>
+                <a:spcPts val="0"/>
+              </a:spcAft>
+              <a:buClr>
+                <a:srgbClr val="000000"/>
+              </a:buClr>
+              <a:buFont typeface="Arial"/>
+              <a:defRPr sz="1400" b="0" i="0" u="none" strike="noStrike" cap="none">
+                <a:solidFill>
+                  <a:srgbClr val="000000"/>
+                </a:solidFill>
+                <a:latin typeface="Arial"/>
+                <a:ea typeface="Arial"/>
+                <a:cs typeface="Arial"/>
+                <a:sym typeface="Arial"/>
+              </a:defRPr>
+            </a:lvl1pPr>
+            <a:lvl2pPr marR="0" lvl="1" algn="l" rtl="0">
+              <a:lnSpc>
+                <a:spcPct val="100000"/>
+              </a:lnSpc>
+              <a:spcBef>
+                <a:spcPts val="0"/>
+              </a:spcBef>
+              <a:spcAft>
+                <a:spcPts val="0"/>
+              </a:spcAft>
+              <a:buClr>
+                <a:srgbClr val="000000"/>
+              </a:buClr>
+              <a:buFont typeface="Arial"/>
+              <a:defRPr sz="1400" b="0" i="0" u="none" strike="noStrike" cap="none">
+                <a:solidFill>
+                  <a:srgbClr val="000000"/>
+                </a:solidFill>
+                <a:latin typeface="Arial"/>
+                <a:ea typeface="Arial"/>
+                <a:cs typeface="Arial"/>
+                <a:sym typeface="Arial"/>
+              </a:defRPr>
+            </a:lvl2pPr>
+            <a:lvl3pPr marR="0" lvl="2" algn="l" rtl="0">
+              <a:lnSpc>
+                <a:spcPct val="100000"/>
+              </a:lnSpc>
+              <a:spcBef>
+                <a:spcPts val="0"/>
+              </a:spcBef>
+              <a:spcAft>
+                <a:spcPts val="0"/>
+              </a:spcAft>
+              <a:buClr>
+                <a:srgbClr val="000000"/>
+              </a:buClr>
+              <a:buFont typeface="Arial"/>
+              <a:defRPr sz="1400" b="0" i="0" u="none" strike="noStrike" cap="none">
+                <a:solidFill>
+                  <a:srgbClr val="000000"/>
+                </a:solidFill>
+                <a:latin typeface="Arial"/>
+                <a:ea typeface="Arial"/>
+                <a:cs typeface="Arial"/>
+                <a:sym typeface="Arial"/>
+              </a:defRPr>
+            </a:lvl3pPr>
+            <a:lvl4pPr marR="0" lvl="3" algn="l" rtl="0">
+              <a:lnSpc>
+                <a:spcPct val="100000"/>
+              </a:lnSpc>
+              <a:spcBef>
+                <a:spcPts val="0"/>
+              </a:spcBef>
+              <a:spcAft>
+                <a:spcPts val="0"/>
+              </a:spcAft>
+              <a:buClr>
+                <a:srgbClr val="000000"/>
+              </a:buClr>
+              <a:buFont typeface="Arial"/>
+              <a:defRPr sz="1400" b="0" i="0" u="none" strike="noStrike" cap="none">
+                <a:solidFill>
+                  <a:srgbClr val="000000"/>
+                </a:solidFill>
+                <a:latin typeface="Arial"/>
+                <a:ea typeface="Arial"/>
+                <a:cs typeface="Arial"/>
+                <a:sym typeface="Arial"/>
+              </a:defRPr>
+            </a:lvl4pPr>
+            <a:lvl5pPr marR="0" lvl="4" algn="l" rtl="0">
+              <a:lnSpc>
+                <a:spcPct val="100000"/>
+              </a:lnSpc>
+              <a:spcBef>
+                <a:spcPts val="0"/>
+              </a:spcBef>
+              <a:spcAft>
+                <a:spcPts val="0"/>
+              </a:spcAft>
+              <a:buClr>
+                <a:srgbClr val="000000"/>
+              </a:buClr>
+              <a:buFont typeface="Arial"/>
+              <a:defRPr sz="1400" b="0" i="0" u="none" strike="noStrike" cap="none">
+                <a:solidFill>
+                  <a:srgbClr val="000000"/>
+                </a:solidFill>
+                <a:latin typeface="Arial"/>
+                <a:ea typeface="Arial"/>
+                <a:cs typeface="Arial"/>
+                <a:sym typeface="Arial"/>
+              </a:defRPr>
+            </a:lvl5pPr>
+            <a:lvl6pPr marR="0" lvl="5" algn="l" rtl="0">
+              <a:lnSpc>
+                <a:spcPct val="100000"/>
+              </a:lnSpc>
+              <a:spcBef>
+                <a:spcPts val="0"/>
+              </a:spcBef>
+              <a:spcAft>
+                <a:spcPts val="0"/>
+              </a:spcAft>
+              <a:buClr>
+                <a:srgbClr val="000000"/>
+              </a:buClr>
+              <a:buFont typeface="Arial"/>
+              <a:defRPr sz="1400" b="0" i="0" u="none" strike="noStrike" cap="none">
+                <a:solidFill>
+                  <a:srgbClr val="000000"/>
+                </a:solidFill>
+                <a:latin typeface="Arial"/>
+                <a:ea typeface="Arial"/>
+                <a:cs typeface="Arial"/>
+                <a:sym typeface="Arial"/>
+              </a:defRPr>
+            </a:lvl6pPr>
+            <a:lvl7pPr marR="0" lvl="6" algn="l" rtl="0">
+              <a:lnSpc>
+                <a:spcPct val="100000"/>
+              </a:lnSpc>
+              <a:spcBef>
+                <a:spcPts val="0"/>
+              </a:spcBef>
+              <a:spcAft>
+                <a:spcPts val="0"/>
+              </a:spcAft>
+              <a:buClr>
+                <a:srgbClr val="000000"/>
+              </a:buClr>
+              <a:buFont typeface="Arial"/>
+              <a:defRPr sz="1400" b="0" i="0" u="none" strike="noStrike" cap="none">
+                <a:solidFill>
+                  <a:srgbClr val="000000"/>
+                </a:solidFill>
+                <a:latin typeface="Arial"/>
+                <a:ea typeface="Arial"/>
+                <a:cs typeface="Arial"/>
+                <a:sym typeface="Arial"/>
+              </a:defRPr>
+            </a:lvl7pPr>
+            <a:lvl8pPr marR="0" lvl="7" algn="l" rtl="0">
+              <a:lnSpc>
+                <a:spcPct val="100000"/>
+              </a:lnSpc>
+              <a:spcBef>
+                <a:spcPts val="0"/>
+              </a:spcBef>
+              <a:spcAft>
+                <a:spcPts val="0"/>
+              </a:spcAft>
+              <a:buClr>
+                <a:srgbClr val="000000"/>
+              </a:buClr>
+              <a:buFont typeface="Arial"/>
+              <a:defRPr sz="1400" b="0" i="0" u="none" strike="noStrike" cap="none">
+                <a:solidFill>
+                  <a:srgbClr val="000000"/>
+                </a:solidFill>
+                <a:latin typeface="Arial"/>
+                <a:ea typeface="Arial"/>
+                <a:cs typeface="Arial"/>
+                <a:sym typeface="Arial"/>
+              </a:defRPr>
+            </a:lvl8pPr>
+            <a:lvl9pPr marR="0" lvl="8" algn="l" rtl="0">
+              <a:lnSpc>
+                <a:spcPct val="100000"/>
+              </a:lnSpc>
+              <a:spcBef>
+                <a:spcPts val="0"/>
+              </a:spcBef>
+              <a:spcAft>
+                <a:spcPts val="0"/>
+              </a:spcAft>
+              <a:buClr>
+                <a:srgbClr val="000000"/>
+              </a:buClr>
+              <a:buFont typeface="Arial"/>
+              <a:defRPr sz="1400" b="0" i="0" u="none" strike="noStrike" cap="none">
+                <a:solidFill>
+                  <a:srgbClr val="000000"/>
+                </a:solidFill>
+                <a:latin typeface="Arial"/>
+                <a:ea typeface="Arial"/>
+                <a:cs typeface="Arial"/>
+                <a:sym typeface="Arial"/>
+              </a:defRPr>
+            </a:lvl9pPr>
+          </a:lstStyle>
+          <a:p>
+            <a:pPr marL="285750" indent="-285750">
+              <a:buFont typeface="Arial" panose="020B0604020202020204" pitchFamily="34" charset="0"/>
+              <a:buChar char="•"/>
+            </a:pPr>
+            <a:endParaRPr lang="en-US" sz="1600" dirty="0">
+              <a:latin typeface="Roboto" panose="02000000000000000000" pitchFamily="2" charset="0"/>
+              <a:ea typeface="Roboto" panose="02000000000000000000" pitchFamily="2" charset="0"/>
+              <a:cs typeface="Roboto" panose="02000000000000000000" pitchFamily="2" charset="0"/>
+            </a:endParaRPr>
+          </a:p>
+        </p:txBody>
+      </p:sp>
+      <p:sp>
+        <p:nvSpPr>
+          <p:cNvPr id="6" name="Rectangle: Rounded Corners 5">
+            <a:extLst>
+              <a:ext uri="{FF2B5EF4-FFF2-40B4-BE49-F238E27FC236}">
+                <a16:creationId xmlns:a16="http://schemas.microsoft.com/office/drawing/2014/main" id="{6F46540A-8FD0-F844-8FCD-F9EC28082D86}"/>
+              </a:ext>
+            </a:extLst>
+          </p:cNvPr>
+          <p:cNvSpPr/>
+          <p:nvPr/>
+        </p:nvSpPr>
+        <p:spPr>
+          <a:xfrm>
+            <a:off x="2755900" y="1168539"/>
+            <a:ext cx="3632200" cy="3708400"/>
+          </a:xfrm>
+          <a:prstGeom prst="roundRect">
+            <a:avLst>
+              <a:gd name="adj" fmla="val 2138"/>
+            </a:avLst>
+          </a:prstGeom>
+          <a:blipFill>
+            <a:blip r:embed="rId3"/>
+            <a:stretch>
+              <a:fillRect/>
+            </a:stretch>
+          </a:blipFill>
+          <a:ln>
+            <a:solidFill>
+              <a:schemeClr val="bg1">
+                <a:lumMod val="50000"/>
+              </a:schemeClr>
+            </a:solidFill>
+          </a:ln>
+        </p:spPr>
+        <p:style>
+          <a:lnRef idx="2">
+            <a:schemeClr val="accent1">
+              <a:shade val="15000"/>
+            </a:schemeClr>
+          </a:lnRef>
+          <a:fillRef idx="1">
+            <a:schemeClr val="accent1"/>
+          </a:fillRef>
+          <a:effectRef idx="0">
+            <a:schemeClr val="accent1"/>
+          </a:effectRef>
+          <a:fontRef idx="minor">
+            <a:schemeClr val="lt1"/>
+          </a:fontRef>
+        </p:style>
+        <p:txBody>
+          <a:bodyPr rtlCol="0" anchor="ctr"/>
+          <a:lstStyle/>
+          <a:p>
+            <a:pPr algn="ctr"/>
+            <a:endParaRPr lang="en-IL" dirty="0"/>
+          </a:p>
+        </p:txBody>
+      </p:sp>
+    </p:spTree>
+    <p:extLst>
+      <p:ext uri="{BB962C8B-B14F-4D97-AF65-F5344CB8AC3E}">
+        <p14:creationId xmlns:p14="http://schemas.microsoft.com/office/powerpoint/2010/main" val="4015911138"/>
+      </p:ext>
+    </p:extLst>
+  </p:cSld>
+  <p:clrMapOvr>
+    <a:masterClrMapping/>
+  </p:clrMapOvr>
+</p:sld>
+</file>
+
+<file path=ppt/slides/slide11.xml><?xml version="1.0" encoding="utf-8"?>
 <p:sld xmlns:a="http://schemas.openxmlformats.org/drawingml/2006/main" xmlns:r="http://schemas.openxmlformats.org/officeDocument/2006/relationships" xmlns:p="http://schemas.openxmlformats.org/presentationml/2006/main">
   <p:cSld>
     <p:spTree>
@@ -33798,7 +34522,7 @@
 </p:sld>
 </file>
 
-<file path=ppt/slides/slide11.xml><?xml version="1.0" encoding="utf-8"?>
+<file path=ppt/slides/slide12.xml><?xml version="1.0" encoding="utf-8"?>
 <p:sld xmlns:a="http://schemas.openxmlformats.org/drawingml/2006/main" xmlns:r="http://schemas.openxmlformats.org/officeDocument/2006/relationships" xmlns:p="http://schemas.openxmlformats.org/presentationml/2006/main">
   <p:cSld>
     <p:spTree>
@@ -33921,7 +34645,7 @@
 </p:sld>
 </file>
 
-<file path=ppt/slides/slide12.xml><?xml version="1.0" encoding="utf-8"?>
+<file path=ppt/slides/slide13.xml><?xml version="1.0" encoding="utf-8"?>
 <p:sld xmlns:a="http://schemas.openxmlformats.org/drawingml/2006/main" xmlns:r="http://schemas.openxmlformats.org/officeDocument/2006/relationships" xmlns:p="http://schemas.openxmlformats.org/presentationml/2006/main">
   <p:cSld>
     <p:spTree>
@@ -34044,7 +34768,7 @@
 </p:sld>
 </file>
 
-<file path=ppt/slides/slide13.xml><?xml version="1.0" encoding="utf-8"?>
+<file path=ppt/slides/slide14.xml><?xml version="1.0" encoding="utf-8"?>
 <p:sld xmlns:a="http://schemas.openxmlformats.org/drawingml/2006/main" xmlns:r="http://schemas.openxmlformats.org/officeDocument/2006/relationships" xmlns:p="http://schemas.openxmlformats.org/presentationml/2006/main">
   <p:cSld>
     <p:spTree>
@@ -34132,7 +34856,7 @@
 </p:sld>
 </file>
 
-<file path=ppt/slides/slide14.xml><?xml version="1.0" encoding="utf-8"?>
+<file path=ppt/slides/slide15.xml><?xml version="1.0" encoding="utf-8"?>
 <p:sld xmlns:a="http://schemas.openxmlformats.org/drawingml/2006/main" xmlns:r="http://schemas.openxmlformats.org/officeDocument/2006/relationships" xmlns:p="http://schemas.openxmlformats.org/presentationml/2006/main">
   <p:cSld>
     <p:spTree>
@@ -34220,7 +34944,7 @@
 </p:sld>
 </file>
 
-<file path=ppt/slides/slide15.xml><?xml version="1.0" encoding="utf-8"?>
+<file path=ppt/slides/slide16.xml><?xml version="1.0" encoding="utf-8"?>
 <p:sld xmlns:a="http://schemas.openxmlformats.org/drawingml/2006/main" xmlns:r="http://schemas.openxmlformats.org/officeDocument/2006/relationships" xmlns:p="http://schemas.openxmlformats.org/presentationml/2006/main">
   <p:cSld>
     <p:spTree>
@@ -36766,7 +37490,7 @@
 </p:sld>
 </file>
 
-<file path=ppt/slides/slide16.xml><?xml version="1.0" encoding="utf-8"?>
+<file path=ppt/slides/slide17.xml><?xml version="1.0" encoding="utf-8"?>
 <p:sld xmlns:a="http://schemas.openxmlformats.org/drawingml/2006/main" xmlns:r="http://schemas.openxmlformats.org/officeDocument/2006/relationships" xmlns:p="http://schemas.openxmlformats.org/presentationml/2006/main">
   <p:cSld>
     <p:spTree>
@@ -36829,7 +37553,7 @@
 </p:sld>
 </file>
 
-<file path=ppt/slides/slide17.xml><?xml version="1.0" encoding="utf-8"?>
+<file path=ppt/slides/slide18.xml><?xml version="1.0" encoding="utf-8"?>
 <p:sld xmlns:a="http://schemas.openxmlformats.org/drawingml/2006/main" xmlns:r="http://schemas.openxmlformats.org/officeDocument/2006/relationships" xmlns:p="http://schemas.openxmlformats.org/presentationml/2006/main">
   <p:cSld>
     <p:spTree>
@@ -39863,7 +40587,7 @@
 </p:sld>
 </file>
 
-<file path=ppt/slides/slide18.xml><?xml version="1.0" encoding="utf-8"?>
+<file path=ppt/slides/slide19.xml><?xml version="1.0" encoding="utf-8"?>
 <p:sld xmlns:a="http://schemas.openxmlformats.org/drawingml/2006/main" xmlns:r="http://schemas.openxmlformats.org/officeDocument/2006/relationships" xmlns:p="http://schemas.openxmlformats.org/presentationml/2006/main">
   <p:cSld>
     <p:spTree>
@@ -39966,7 +40690,1077 @@
 </p:sld>
 </file>
 
-<file path=ppt/slides/slide19.xml><?xml version="1.0" encoding="utf-8"?>
+<file path=ppt/slides/slide2.xml><?xml version="1.0" encoding="utf-8"?>
+<p:sld xmlns:a="http://schemas.openxmlformats.org/drawingml/2006/main" xmlns:r="http://schemas.openxmlformats.org/officeDocument/2006/relationships" xmlns:p="http://schemas.openxmlformats.org/presentationml/2006/main">
+  <p:cSld>
+    <p:spTree>
+      <p:nvGrpSpPr>
+        <p:cNvPr id="1" name="Shape 822"/>
+        <p:cNvGrpSpPr/>
+        <p:nvPr/>
+      </p:nvGrpSpPr>
+      <p:grpSpPr>
+        <a:xfrm>
+          <a:off x="0" y="0"/>
+          <a:ext cx="0" cy="0"/>
+          <a:chOff x="0" y="0"/>
+          <a:chExt cx="0" cy="0"/>
+        </a:xfrm>
+      </p:grpSpPr>
+      <p:sp>
+        <p:nvSpPr>
+          <p:cNvPr id="823" name="Google Shape;823;p42"/>
+          <p:cNvSpPr txBox="1">
+            <a:spLocks noGrp="1"/>
+          </p:cNvSpPr>
+          <p:nvPr>
+            <p:ph type="title" idx="9"/>
+          </p:nvPr>
+        </p:nvSpPr>
+        <p:spPr>
+          <a:xfrm>
+            <a:off x="720000" y="387600"/>
+            <a:ext cx="7704000" cy="612600"/>
+          </a:xfrm>
+          <a:prstGeom prst="rect">
+            <a:avLst/>
+          </a:prstGeom>
+        </p:spPr>
+        <p:txBody>
+          <a:bodyPr spcFirstLastPara="1" wrap="square" lIns="91425" tIns="91425" rIns="91425" bIns="91425" anchor="t" anchorCtr="0">
+            <a:noAutofit/>
+          </a:bodyPr>
+          <a:lstStyle/>
+          <a:p>
+            <a:pPr marL="0" lvl="0" indent="0" algn="l" rtl="0">
+              <a:spcBef>
+                <a:spcPts val="0"/>
+              </a:spcBef>
+              <a:spcAft>
+                <a:spcPts val="0"/>
+              </a:spcAft>
+              <a:buNone/>
+            </a:pPr>
+            <a:r>
+              <a:rPr lang="en"/>
+              <a:t>Agenda</a:t>
+            </a:r>
+            <a:endParaRPr/>
+          </a:p>
+        </p:txBody>
+      </p:sp>
+      <p:sp>
+        <p:nvSpPr>
+          <p:cNvPr id="824" name="Google Shape;824;p42"/>
+          <p:cNvSpPr/>
+          <p:nvPr/>
+        </p:nvSpPr>
+        <p:spPr>
+          <a:xfrm>
+            <a:off x="626363" y="1771214"/>
+            <a:ext cx="1138500" cy="1140900"/>
+          </a:xfrm>
+          <a:prstGeom prst="roundRect">
+            <a:avLst>
+              <a:gd name="adj" fmla="val 50000"/>
+            </a:avLst>
+          </a:prstGeom>
+          <a:solidFill>
+            <a:srgbClr val="FFFFFF"/>
+          </a:solidFill>
+          <a:ln>
+            <a:noFill/>
+          </a:ln>
+        </p:spPr>
+        <p:txBody>
+          <a:bodyPr spcFirstLastPara="1" wrap="square" lIns="91425" tIns="91425" rIns="91425" bIns="91425" anchor="ctr" anchorCtr="0">
+            <a:noAutofit/>
+          </a:bodyPr>
+          <a:lstStyle/>
+          <a:p>
+            <a:pPr marL="0" lvl="0" indent="0" algn="l" rtl="0">
+              <a:spcBef>
+                <a:spcPts val="0"/>
+              </a:spcBef>
+              <a:spcAft>
+                <a:spcPts val="0"/>
+              </a:spcAft>
+              <a:buNone/>
+            </a:pPr>
+            <a:endParaRPr/>
+          </a:p>
+        </p:txBody>
+      </p:sp>
+      <p:sp>
+        <p:nvSpPr>
+          <p:cNvPr id="825" name="Google Shape;825;p42"/>
+          <p:cNvSpPr/>
+          <p:nvPr/>
+        </p:nvSpPr>
+        <p:spPr>
+          <a:xfrm>
+            <a:off x="2744513" y="1771214"/>
+            <a:ext cx="1138500" cy="1140900"/>
+          </a:xfrm>
+          <a:prstGeom prst="roundRect">
+            <a:avLst>
+              <a:gd name="adj" fmla="val 50000"/>
+            </a:avLst>
+          </a:prstGeom>
+          <a:solidFill>
+            <a:srgbClr val="FFFFFF"/>
+          </a:solidFill>
+          <a:ln>
+            <a:noFill/>
+          </a:ln>
+        </p:spPr>
+        <p:txBody>
+          <a:bodyPr spcFirstLastPara="1" wrap="square" lIns="91425" tIns="91425" rIns="91425" bIns="91425" anchor="ctr" anchorCtr="0">
+            <a:noAutofit/>
+          </a:bodyPr>
+          <a:lstStyle/>
+          <a:p>
+            <a:pPr marL="0" lvl="0" indent="0" algn="l" rtl="0">
+              <a:spcBef>
+                <a:spcPts val="0"/>
+              </a:spcBef>
+              <a:spcAft>
+                <a:spcPts val="0"/>
+              </a:spcAft>
+              <a:buNone/>
+            </a:pPr>
+            <a:endParaRPr/>
+          </a:p>
+        </p:txBody>
+      </p:sp>
+      <p:sp>
+        <p:nvSpPr>
+          <p:cNvPr id="826" name="Google Shape;826;p42"/>
+          <p:cNvSpPr/>
+          <p:nvPr/>
+        </p:nvSpPr>
+        <p:spPr>
+          <a:xfrm>
+            <a:off x="4983345" y="1771214"/>
+            <a:ext cx="1138500" cy="1140900"/>
+          </a:xfrm>
+          <a:prstGeom prst="roundRect">
+            <a:avLst>
+              <a:gd name="adj" fmla="val 50000"/>
+            </a:avLst>
+          </a:prstGeom>
+          <a:solidFill>
+            <a:srgbClr val="FFFFFF"/>
+          </a:solidFill>
+          <a:ln>
+            <a:noFill/>
+          </a:ln>
+        </p:spPr>
+        <p:txBody>
+          <a:bodyPr spcFirstLastPara="1" wrap="square" lIns="91425" tIns="91425" rIns="91425" bIns="91425" anchor="ctr" anchorCtr="0">
+            <a:noAutofit/>
+          </a:bodyPr>
+          <a:lstStyle/>
+          <a:p>
+            <a:pPr marL="0" lvl="0" indent="0" algn="l" rtl="0">
+              <a:spcBef>
+                <a:spcPts val="0"/>
+              </a:spcBef>
+              <a:spcAft>
+                <a:spcPts val="0"/>
+              </a:spcAft>
+              <a:buNone/>
+            </a:pPr>
+            <a:endParaRPr/>
+          </a:p>
+        </p:txBody>
+      </p:sp>
+      <p:sp>
+        <p:nvSpPr>
+          <p:cNvPr id="827" name="Google Shape;827;p42"/>
+          <p:cNvSpPr txBox="1">
+            <a:spLocks noGrp="1"/>
+          </p:cNvSpPr>
+          <p:nvPr>
+            <p:ph type="title"/>
+          </p:nvPr>
+        </p:nvSpPr>
+        <p:spPr>
+          <a:xfrm>
+            <a:off x="752663" y="2066258"/>
+            <a:ext cx="885900" cy="650400"/>
+          </a:xfrm>
+          <a:prstGeom prst="rect">
+            <a:avLst/>
+          </a:prstGeom>
+        </p:spPr>
+        <p:txBody>
+          <a:bodyPr spcFirstLastPara="1" wrap="square" lIns="91425" tIns="91425" rIns="91425" bIns="91425" anchor="ctr" anchorCtr="0">
+            <a:noAutofit/>
+          </a:bodyPr>
+          <a:lstStyle/>
+          <a:p>
+            <a:pPr marL="0" lvl="0" indent="0" algn="ctr" rtl="0">
+              <a:spcBef>
+                <a:spcPts val="0"/>
+              </a:spcBef>
+              <a:spcAft>
+                <a:spcPts val="0"/>
+              </a:spcAft>
+              <a:buNone/>
+            </a:pPr>
+            <a:r>
+              <a:rPr lang="en" dirty="0"/>
+              <a:t>01</a:t>
+            </a:r>
+            <a:endParaRPr dirty="0"/>
+          </a:p>
+        </p:txBody>
+      </p:sp>
+      <p:sp>
+        <p:nvSpPr>
+          <p:cNvPr id="828" name="Google Shape;828;p42"/>
+          <p:cNvSpPr txBox="1">
+            <a:spLocks noGrp="1"/>
+          </p:cNvSpPr>
+          <p:nvPr>
+            <p:ph type="subTitle" idx="1"/>
+          </p:nvPr>
+        </p:nvSpPr>
+        <p:spPr>
+          <a:xfrm>
+            <a:off x="100176" y="3014537"/>
+            <a:ext cx="2181300" cy="371400"/>
+          </a:xfrm>
+          <a:prstGeom prst="rect">
+            <a:avLst/>
+          </a:prstGeom>
+        </p:spPr>
+        <p:txBody>
+          <a:bodyPr spcFirstLastPara="1" wrap="square" lIns="91425" tIns="91425" rIns="91425" bIns="91425" anchor="t" anchorCtr="0">
+            <a:noAutofit/>
+          </a:bodyPr>
+          <a:lstStyle/>
+          <a:p>
+            <a:pPr marL="0" lvl="0" indent="0" algn="ctr">
+              <a:spcBef>
+                <a:spcPts val="0"/>
+              </a:spcBef>
+              <a:spcAft>
+                <a:spcPts val="0"/>
+              </a:spcAft>
+              <a:buNone/>
+            </a:pPr>
+            <a:r>
+              <a:rPr lang="en-US" dirty="0"/>
+              <a:t>Introduction</a:t>
+            </a:r>
+          </a:p>
+        </p:txBody>
+      </p:sp>
+      <p:sp>
+        <p:nvSpPr>
+          <p:cNvPr id="830" name="Google Shape;830;p42"/>
+          <p:cNvSpPr txBox="1">
+            <a:spLocks noGrp="1"/>
+          </p:cNvSpPr>
+          <p:nvPr>
+            <p:ph type="title" idx="3"/>
+          </p:nvPr>
+        </p:nvSpPr>
+        <p:spPr>
+          <a:xfrm>
+            <a:off x="2870813" y="2066258"/>
+            <a:ext cx="885900" cy="650400"/>
+          </a:xfrm>
+          <a:prstGeom prst="rect">
+            <a:avLst/>
+          </a:prstGeom>
+        </p:spPr>
+        <p:txBody>
+          <a:bodyPr spcFirstLastPara="1" wrap="square" lIns="91425" tIns="91425" rIns="91425" bIns="91425" anchor="ctr" anchorCtr="0">
+            <a:noAutofit/>
+          </a:bodyPr>
+          <a:lstStyle/>
+          <a:p>
+            <a:pPr marL="0" lvl="0" indent="0" algn="ctr" rtl="0">
+              <a:spcBef>
+                <a:spcPts val="0"/>
+              </a:spcBef>
+              <a:spcAft>
+                <a:spcPts val="0"/>
+              </a:spcAft>
+              <a:buNone/>
+            </a:pPr>
+            <a:r>
+              <a:rPr lang="en" dirty="0"/>
+              <a:t>02</a:t>
+            </a:r>
+            <a:endParaRPr dirty="0"/>
+          </a:p>
+        </p:txBody>
+      </p:sp>
+      <p:sp>
+        <p:nvSpPr>
+          <p:cNvPr id="831" name="Google Shape;831;p42"/>
+          <p:cNvSpPr txBox="1">
+            <a:spLocks noGrp="1"/>
+          </p:cNvSpPr>
+          <p:nvPr>
+            <p:ph type="subTitle" idx="4"/>
+          </p:nvPr>
+        </p:nvSpPr>
+        <p:spPr>
+          <a:xfrm>
+            <a:off x="2223113" y="3014537"/>
+            <a:ext cx="2181300" cy="371400"/>
+          </a:xfrm>
+          <a:prstGeom prst="rect">
+            <a:avLst/>
+          </a:prstGeom>
+        </p:spPr>
+        <p:txBody>
+          <a:bodyPr spcFirstLastPara="1" wrap="square" lIns="91425" tIns="91425" rIns="91425" bIns="91425" anchor="t" anchorCtr="0">
+            <a:noAutofit/>
+          </a:bodyPr>
+          <a:lstStyle/>
+          <a:p>
+            <a:pPr marL="0" lvl="0" indent="0" algn="ctr" rtl="0">
+              <a:spcBef>
+                <a:spcPts val="0"/>
+              </a:spcBef>
+              <a:spcAft>
+                <a:spcPts val="0"/>
+              </a:spcAft>
+              <a:buNone/>
+            </a:pPr>
+            <a:r>
+              <a:rPr lang="en" dirty="0"/>
+              <a:t>Solution</a:t>
+            </a:r>
+            <a:endParaRPr dirty="0"/>
+          </a:p>
+        </p:txBody>
+      </p:sp>
+      <p:sp>
+        <p:nvSpPr>
+          <p:cNvPr id="833" name="Google Shape;833;p42"/>
+          <p:cNvSpPr txBox="1">
+            <a:spLocks noGrp="1"/>
+          </p:cNvSpPr>
+          <p:nvPr>
+            <p:ph type="title" idx="6"/>
+          </p:nvPr>
+        </p:nvSpPr>
+        <p:spPr>
+          <a:xfrm>
+            <a:off x="5109645" y="2066258"/>
+            <a:ext cx="885900" cy="650400"/>
+          </a:xfrm>
+          <a:prstGeom prst="rect">
+            <a:avLst/>
+          </a:prstGeom>
+        </p:spPr>
+        <p:txBody>
+          <a:bodyPr spcFirstLastPara="1" wrap="square" lIns="91425" tIns="91425" rIns="91425" bIns="91425" anchor="ctr" anchorCtr="0">
+            <a:noAutofit/>
+          </a:bodyPr>
+          <a:lstStyle/>
+          <a:p>
+            <a:pPr marL="0" lvl="0" indent="0" algn="ctr" rtl="0">
+              <a:spcBef>
+                <a:spcPts val="0"/>
+              </a:spcBef>
+              <a:spcAft>
+                <a:spcPts val="0"/>
+              </a:spcAft>
+              <a:buNone/>
+            </a:pPr>
+            <a:r>
+              <a:rPr lang="en" dirty="0"/>
+              <a:t>03</a:t>
+            </a:r>
+            <a:endParaRPr dirty="0"/>
+          </a:p>
+        </p:txBody>
+      </p:sp>
+      <p:sp>
+        <p:nvSpPr>
+          <p:cNvPr id="834" name="Google Shape;834;p42"/>
+          <p:cNvSpPr txBox="1">
+            <a:spLocks noGrp="1"/>
+          </p:cNvSpPr>
+          <p:nvPr>
+            <p:ph type="subTitle" idx="7"/>
+          </p:nvPr>
+        </p:nvSpPr>
+        <p:spPr>
+          <a:xfrm>
+            <a:off x="4461945" y="3014537"/>
+            <a:ext cx="2181300" cy="371400"/>
+          </a:xfrm>
+          <a:prstGeom prst="rect">
+            <a:avLst/>
+          </a:prstGeom>
+        </p:spPr>
+        <p:txBody>
+          <a:bodyPr spcFirstLastPara="1" wrap="square" lIns="91425" tIns="91425" rIns="91425" bIns="91425" anchor="t" anchorCtr="0">
+            <a:noAutofit/>
+          </a:bodyPr>
+          <a:lstStyle/>
+          <a:p>
+            <a:pPr marL="0" lvl="0" indent="0" algn="ctr" rtl="0">
+              <a:spcBef>
+                <a:spcPts val="0"/>
+              </a:spcBef>
+              <a:spcAft>
+                <a:spcPts val="0"/>
+              </a:spcAft>
+              <a:buNone/>
+            </a:pPr>
+            <a:r>
+              <a:rPr lang="en"/>
+              <a:t>Model Architecture</a:t>
+            </a:r>
+            <a:endParaRPr/>
+          </a:p>
+        </p:txBody>
+      </p:sp>
+      <p:sp>
+        <p:nvSpPr>
+          <p:cNvPr id="2" name="Google Shape;826;p42">
+            <a:extLst>
+              <a:ext uri="{FF2B5EF4-FFF2-40B4-BE49-F238E27FC236}">
+                <a16:creationId xmlns:a16="http://schemas.microsoft.com/office/drawing/2014/main" id="{82CC75F4-CD25-8500-942F-1C588B1297BF}"/>
+              </a:ext>
+            </a:extLst>
+          </p:cNvPr>
+          <p:cNvSpPr/>
+          <p:nvPr/>
+        </p:nvSpPr>
+        <p:spPr>
+          <a:xfrm>
+            <a:off x="7285500" y="1771214"/>
+            <a:ext cx="1138500" cy="1140900"/>
+          </a:xfrm>
+          <a:prstGeom prst="roundRect">
+            <a:avLst>
+              <a:gd name="adj" fmla="val 50000"/>
+            </a:avLst>
+          </a:prstGeom>
+          <a:solidFill>
+            <a:srgbClr val="FFFFFF"/>
+          </a:solidFill>
+          <a:ln>
+            <a:noFill/>
+          </a:ln>
+        </p:spPr>
+        <p:txBody>
+          <a:bodyPr spcFirstLastPara="1" wrap="square" lIns="91425" tIns="91425" rIns="91425" bIns="91425" anchor="ctr" anchorCtr="0">
+            <a:noAutofit/>
+          </a:bodyPr>
+          <a:lstStyle/>
+          <a:p>
+            <a:pPr marL="0" lvl="0" indent="0" algn="l" rtl="0">
+              <a:spcBef>
+                <a:spcPts val="0"/>
+              </a:spcBef>
+              <a:spcAft>
+                <a:spcPts val="0"/>
+              </a:spcAft>
+              <a:buNone/>
+            </a:pPr>
+            <a:endParaRPr/>
+          </a:p>
+        </p:txBody>
+      </p:sp>
+      <p:sp>
+        <p:nvSpPr>
+          <p:cNvPr id="3" name="Google Shape;833;p42">
+            <a:extLst>
+              <a:ext uri="{FF2B5EF4-FFF2-40B4-BE49-F238E27FC236}">
+                <a16:creationId xmlns:a16="http://schemas.microsoft.com/office/drawing/2014/main" id="{D0D54B40-9489-7139-08C8-6D9710DE1F48}"/>
+              </a:ext>
+            </a:extLst>
+          </p:cNvPr>
+          <p:cNvSpPr txBox="1">
+            <a:spLocks/>
+          </p:cNvSpPr>
+          <p:nvPr/>
+        </p:nvSpPr>
+        <p:spPr>
+          <a:xfrm>
+            <a:off x="7411800" y="2066258"/>
+            <a:ext cx="885900" cy="650400"/>
+          </a:xfrm>
+          <a:prstGeom prst="rect">
+            <a:avLst/>
+          </a:prstGeom>
+          <a:noFill/>
+          <a:ln>
+            <a:noFill/>
+          </a:ln>
+        </p:spPr>
+        <p:txBody>
+          <a:bodyPr spcFirstLastPara="1" wrap="square" lIns="91425" tIns="91425" rIns="91425" bIns="91425" anchor="ctr" anchorCtr="0">
+            <a:noAutofit/>
+          </a:bodyPr>
+          <a:lstStyle>
+            <a:defPPr marR="0" lvl="0" algn="l" rtl="0">
+              <a:lnSpc>
+                <a:spcPct val="100000"/>
+              </a:lnSpc>
+              <a:spcBef>
+                <a:spcPts val="0"/>
+              </a:spcBef>
+              <a:spcAft>
+                <a:spcPts val="0"/>
+              </a:spcAft>
+            </a:defPPr>
+            <a:lvl1pPr marR="0" lvl="0" algn="ctr" rtl="0">
+              <a:lnSpc>
+                <a:spcPct val="100000"/>
+              </a:lnSpc>
+              <a:spcBef>
+                <a:spcPts val="0"/>
+              </a:spcBef>
+              <a:spcAft>
+                <a:spcPts val="0"/>
+              </a:spcAft>
+              <a:buClr>
+                <a:schemeClr val="dk1"/>
+              </a:buClr>
+              <a:buSzPts val="4800"/>
+              <a:buFont typeface="Oswald"/>
+              <a:buNone/>
+              <a:defRPr sz="4800" b="1" i="0" u="none" strike="noStrike" cap="none">
+                <a:solidFill>
+                  <a:schemeClr val="dk1"/>
+                </a:solidFill>
+                <a:latin typeface="Oswald"/>
+                <a:ea typeface="Oswald"/>
+                <a:cs typeface="Oswald"/>
+                <a:sym typeface="Oswald"/>
+              </a:defRPr>
+            </a:lvl1pPr>
+            <a:lvl2pPr marR="0" lvl="1" algn="ctr" rtl="0">
+              <a:lnSpc>
+                <a:spcPct val="100000"/>
+              </a:lnSpc>
+              <a:spcBef>
+                <a:spcPts val="0"/>
+              </a:spcBef>
+              <a:spcAft>
+                <a:spcPts val="0"/>
+              </a:spcAft>
+              <a:buClr>
+                <a:schemeClr val="dk1"/>
+              </a:buClr>
+              <a:buSzPts val="4800"/>
+              <a:buFont typeface="Oswald"/>
+              <a:buNone/>
+              <a:defRPr sz="4800" b="0" i="0" u="none" strike="noStrike" cap="none">
+                <a:solidFill>
+                  <a:schemeClr val="dk1"/>
+                </a:solidFill>
+                <a:latin typeface="Oswald"/>
+                <a:ea typeface="Oswald"/>
+                <a:cs typeface="Oswald"/>
+                <a:sym typeface="Oswald"/>
+              </a:defRPr>
+            </a:lvl2pPr>
+            <a:lvl3pPr marR="0" lvl="2" algn="ctr" rtl="0">
+              <a:lnSpc>
+                <a:spcPct val="100000"/>
+              </a:lnSpc>
+              <a:spcBef>
+                <a:spcPts val="0"/>
+              </a:spcBef>
+              <a:spcAft>
+                <a:spcPts val="0"/>
+              </a:spcAft>
+              <a:buClr>
+                <a:schemeClr val="dk1"/>
+              </a:buClr>
+              <a:buSzPts val="4800"/>
+              <a:buFont typeface="Oswald"/>
+              <a:buNone/>
+              <a:defRPr sz="4800" b="0" i="0" u="none" strike="noStrike" cap="none">
+                <a:solidFill>
+                  <a:schemeClr val="dk1"/>
+                </a:solidFill>
+                <a:latin typeface="Oswald"/>
+                <a:ea typeface="Oswald"/>
+                <a:cs typeface="Oswald"/>
+                <a:sym typeface="Oswald"/>
+              </a:defRPr>
+            </a:lvl3pPr>
+            <a:lvl4pPr marR="0" lvl="3" algn="ctr" rtl="0">
+              <a:lnSpc>
+                <a:spcPct val="100000"/>
+              </a:lnSpc>
+              <a:spcBef>
+                <a:spcPts val="0"/>
+              </a:spcBef>
+              <a:spcAft>
+                <a:spcPts val="0"/>
+              </a:spcAft>
+              <a:buClr>
+                <a:schemeClr val="dk1"/>
+              </a:buClr>
+              <a:buSzPts val="4800"/>
+              <a:buFont typeface="Oswald"/>
+              <a:buNone/>
+              <a:defRPr sz="4800" b="0" i="0" u="none" strike="noStrike" cap="none">
+                <a:solidFill>
+                  <a:schemeClr val="dk1"/>
+                </a:solidFill>
+                <a:latin typeface="Oswald"/>
+                <a:ea typeface="Oswald"/>
+                <a:cs typeface="Oswald"/>
+                <a:sym typeface="Oswald"/>
+              </a:defRPr>
+            </a:lvl4pPr>
+            <a:lvl5pPr marR="0" lvl="4" algn="ctr" rtl="0">
+              <a:lnSpc>
+                <a:spcPct val="100000"/>
+              </a:lnSpc>
+              <a:spcBef>
+                <a:spcPts val="0"/>
+              </a:spcBef>
+              <a:spcAft>
+                <a:spcPts val="0"/>
+              </a:spcAft>
+              <a:buClr>
+                <a:schemeClr val="dk1"/>
+              </a:buClr>
+              <a:buSzPts val="4800"/>
+              <a:buFont typeface="Oswald"/>
+              <a:buNone/>
+              <a:defRPr sz="4800" b="0" i="0" u="none" strike="noStrike" cap="none">
+                <a:solidFill>
+                  <a:schemeClr val="dk1"/>
+                </a:solidFill>
+                <a:latin typeface="Oswald"/>
+                <a:ea typeface="Oswald"/>
+                <a:cs typeface="Oswald"/>
+                <a:sym typeface="Oswald"/>
+              </a:defRPr>
+            </a:lvl5pPr>
+            <a:lvl6pPr marR="0" lvl="5" algn="ctr" rtl="0">
+              <a:lnSpc>
+                <a:spcPct val="100000"/>
+              </a:lnSpc>
+              <a:spcBef>
+                <a:spcPts val="0"/>
+              </a:spcBef>
+              <a:spcAft>
+                <a:spcPts val="0"/>
+              </a:spcAft>
+              <a:buClr>
+                <a:schemeClr val="dk1"/>
+              </a:buClr>
+              <a:buSzPts val="4800"/>
+              <a:buFont typeface="Oswald"/>
+              <a:buNone/>
+              <a:defRPr sz="4800" b="0" i="0" u="none" strike="noStrike" cap="none">
+                <a:solidFill>
+                  <a:schemeClr val="dk1"/>
+                </a:solidFill>
+                <a:latin typeface="Oswald"/>
+                <a:ea typeface="Oswald"/>
+                <a:cs typeface="Oswald"/>
+                <a:sym typeface="Oswald"/>
+              </a:defRPr>
+            </a:lvl6pPr>
+            <a:lvl7pPr marR="0" lvl="6" algn="ctr" rtl="0">
+              <a:lnSpc>
+                <a:spcPct val="100000"/>
+              </a:lnSpc>
+              <a:spcBef>
+                <a:spcPts val="0"/>
+              </a:spcBef>
+              <a:spcAft>
+                <a:spcPts val="0"/>
+              </a:spcAft>
+              <a:buClr>
+                <a:schemeClr val="dk1"/>
+              </a:buClr>
+              <a:buSzPts val="4800"/>
+              <a:buFont typeface="Oswald"/>
+              <a:buNone/>
+              <a:defRPr sz="4800" b="0" i="0" u="none" strike="noStrike" cap="none">
+                <a:solidFill>
+                  <a:schemeClr val="dk1"/>
+                </a:solidFill>
+                <a:latin typeface="Oswald"/>
+                <a:ea typeface="Oswald"/>
+                <a:cs typeface="Oswald"/>
+                <a:sym typeface="Oswald"/>
+              </a:defRPr>
+            </a:lvl7pPr>
+            <a:lvl8pPr marR="0" lvl="7" algn="ctr" rtl="0">
+              <a:lnSpc>
+                <a:spcPct val="100000"/>
+              </a:lnSpc>
+              <a:spcBef>
+                <a:spcPts val="0"/>
+              </a:spcBef>
+              <a:spcAft>
+                <a:spcPts val="0"/>
+              </a:spcAft>
+              <a:buClr>
+                <a:schemeClr val="dk1"/>
+              </a:buClr>
+              <a:buSzPts val="4800"/>
+              <a:buFont typeface="Oswald"/>
+              <a:buNone/>
+              <a:defRPr sz="4800" b="0" i="0" u="none" strike="noStrike" cap="none">
+                <a:solidFill>
+                  <a:schemeClr val="dk1"/>
+                </a:solidFill>
+                <a:latin typeface="Oswald"/>
+                <a:ea typeface="Oswald"/>
+                <a:cs typeface="Oswald"/>
+                <a:sym typeface="Oswald"/>
+              </a:defRPr>
+            </a:lvl8pPr>
+            <a:lvl9pPr marR="0" lvl="8" algn="ctr" rtl="0">
+              <a:lnSpc>
+                <a:spcPct val="100000"/>
+              </a:lnSpc>
+              <a:spcBef>
+                <a:spcPts val="0"/>
+              </a:spcBef>
+              <a:spcAft>
+                <a:spcPts val="0"/>
+              </a:spcAft>
+              <a:buClr>
+                <a:schemeClr val="dk1"/>
+              </a:buClr>
+              <a:buSzPts val="4800"/>
+              <a:buFont typeface="Oswald"/>
+              <a:buNone/>
+              <a:defRPr sz="4800" b="0" i="0" u="none" strike="noStrike" cap="none">
+                <a:solidFill>
+                  <a:schemeClr val="dk1"/>
+                </a:solidFill>
+                <a:latin typeface="Oswald"/>
+                <a:ea typeface="Oswald"/>
+                <a:cs typeface="Oswald"/>
+                <a:sym typeface="Oswald"/>
+              </a:defRPr>
+            </a:lvl9pPr>
+          </a:lstStyle>
+          <a:p>
+            <a:r>
+              <a:rPr lang="en" dirty="0"/>
+              <a:t>04</a:t>
+            </a:r>
+          </a:p>
+        </p:txBody>
+      </p:sp>
+      <p:sp>
+        <p:nvSpPr>
+          <p:cNvPr id="4" name="Google Shape;834;p42">
+            <a:extLst>
+              <a:ext uri="{FF2B5EF4-FFF2-40B4-BE49-F238E27FC236}">
+                <a16:creationId xmlns:a16="http://schemas.microsoft.com/office/drawing/2014/main" id="{A9AD694E-5FC3-F507-FF2E-33CF891743C4}"/>
+              </a:ext>
+            </a:extLst>
+          </p:cNvPr>
+          <p:cNvSpPr txBox="1">
+            <a:spLocks/>
+          </p:cNvSpPr>
+          <p:nvPr/>
+        </p:nvSpPr>
+        <p:spPr>
+          <a:xfrm>
+            <a:off x="6764100" y="3014537"/>
+            <a:ext cx="2181300" cy="371400"/>
+          </a:xfrm>
+          <a:prstGeom prst="rect">
+            <a:avLst/>
+          </a:prstGeom>
+          <a:noFill/>
+          <a:ln>
+            <a:noFill/>
+          </a:ln>
+        </p:spPr>
+        <p:txBody>
+          <a:bodyPr spcFirstLastPara="1" wrap="square" lIns="91425" tIns="91425" rIns="91425" bIns="91425" anchor="t" anchorCtr="0">
+            <a:noAutofit/>
+          </a:bodyPr>
+          <a:lstStyle>
+            <a:defPPr marR="0" lvl="0" algn="l" rtl="0">
+              <a:lnSpc>
+                <a:spcPct val="100000"/>
+              </a:lnSpc>
+              <a:spcBef>
+                <a:spcPts val="0"/>
+              </a:spcBef>
+              <a:spcAft>
+                <a:spcPts val="0"/>
+              </a:spcAft>
+            </a:defPPr>
+            <a:lvl1pPr marL="457200" marR="0" lvl="0" indent="-342900" algn="ctr" rtl="0">
+              <a:lnSpc>
+                <a:spcPct val="100000"/>
+              </a:lnSpc>
+              <a:spcBef>
+                <a:spcPts val="0"/>
+              </a:spcBef>
+              <a:spcAft>
+                <a:spcPts val="0"/>
+              </a:spcAft>
+              <a:buClr>
+                <a:schemeClr val="dk1"/>
+              </a:buClr>
+              <a:buSzPts val="1800"/>
+              <a:buFont typeface="Roboto"/>
+              <a:buNone/>
+              <a:defRPr sz="2000" b="1" i="0" u="none" strike="noStrike" cap="none">
+                <a:solidFill>
+                  <a:schemeClr val="dk1"/>
+                </a:solidFill>
+                <a:latin typeface="Oswald"/>
+                <a:ea typeface="Oswald"/>
+                <a:cs typeface="Oswald"/>
+                <a:sym typeface="Oswald"/>
+              </a:defRPr>
+            </a:lvl1pPr>
+            <a:lvl2pPr marL="914400" marR="0" lvl="1" indent="-317500" algn="l" rtl="0">
+              <a:lnSpc>
+                <a:spcPct val="100000"/>
+              </a:lnSpc>
+              <a:spcBef>
+                <a:spcPts val="0"/>
+              </a:spcBef>
+              <a:spcAft>
+                <a:spcPts val="0"/>
+              </a:spcAft>
+              <a:buClr>
+                <a:schemeClr val="dk1"/>
+              </a:buClr>
+              <a:buSzPts val="1400"/>
+              <a:buFont typeface="Roboto"/>
+              <a:buNone/>
+              <a:defRPr sz="2000" b="1" i="0" u="none" strike="noStrike" cap="none">
+                <a:solidFill>
+                  <a:schemeClr val="dk1"/>
+                </a:solidFill>
+                <a:latin typeface="Oswald"/>
+                <a:ea typeface="Oswald"/>
+                <a:cs typeface="Oswald"/>
+                <a:sym typeface="Oswald"/>
+              </a:defRPr>
+            </a:lvl2pPr>
+            <a:lvl3pPr marL="1371600" marR="0" lvl="2" indent="-317500" algn="l" rtl="0">
+              <a:lnSpc>
+                <a:spcPct val="100000"/>
+              </a:lnSpc>
+              <a:spcBef>
+                <a:spcPts val="0"/>
+              </a:spcBef>
+              <a:spcAft>
+                <a:spcPts val="0"/>
+              </a:spcAft>
+              <a:buClr>
+                <a:schemeClr val="dk1"/>
+              </a:buClr>
+              <a:buSzPts val="1400"/>
+              <a:buFont typeface="Roboto"/>
+              <a:buNone/>
+              <a:defRPr sz="2000" b="1" i="0" u="none" strike="noStrike" cap="none">
+                <a:solidFill>
+                  <a:schemeClr val="dk1"/>
+                </a:solidFill>
+                <a:latin typeface="Oswald"/>
+                <a:ea typeface="Oswald"/>
+                <a:cs typeface="Oswald"/>
+                <a:sym typeface="Oswald"/>
+              </a:defRPr>
+            </a:lvl3pPr>
+            <a:lvl4pPr marL="1828800" marR="0" lvl="3" indent="-317500" algn="l" rtl="0">
+              <a:lnSpc>
+                <a:spcPct val="100000"/>
+              </a:lnSpc>
+              <a:spcBef>
+                <a:spcPts val="0"/>
+              </a:spcBef>
+              <a:spcAft>
+                <a:spcPts val="0"/>
+              </a:spcAft>
+              <a:buClr>
+                <a:schemeClr val="dk1"/>
+              </a:buClr>
+              <a:buSzPts val="1400"/>
+              <a:buFont typeface="Roboto"/>
+              <a:buNone/>
+              <a:defRPr sz="2000" b="1" i="0" u="none" strike="noStrike" cap="none">
+                <a:solidFill>
+                  <a:schemeClr val="dk1"/>
+                </a:solidFill>
+                <a:latin typeface="Oswald"/>
+                <a:ea typeface="Oswald"/>
+                <a:cs typeface="Oswald"/>
+                <a:sym typeface="Oswald"/>
+              </a:defRPr>
+            </a:lvl4pPr>
+            <a:lvl5pPr marL="2286000" marR="0" lvl="4" indent="-317500" algn="l" rtl="0">
+              <a:lnSpc>
+                <a:spcPct val="100000"/>
+              </a:lnSpc>
+              <a:spcBef>
+                <a:spcPts val="0"/>
+              </a:spcBef>
+              <a:spcAft>
+                <a:spcPts val="0"/>
+              </a:spcAft>
+              <a:buClr>
+                <a:schemeClr val="dk1"/>
+              </a:buClr>
+              <a:buSzPts val="1400"/>
+              <a:buFont typeface="Roboto"/>
+              <a:buNone/>
+              <a:defRPr sz="2000" b="1" i="0" u="none" strike="noStrike" cap="none">
+                <a:solidFill>
+                  <a:schemeClr val="dk1"/>
+                </a:solidFill>
+                <a:latin typeface="Oswald"/>
+                <a:ea typeface="Oswald"/>
+                <a:cs typeface="Oswald"/>
+                <a:sym typeface="Oswald"/>
+              </a:defRPr>
+            </a:lvl5pPr>
+            <a:lvl6pPr marL="2743200" marR="0" lvl="5" indent="-317500" algn="l" rtl="0">
+              <a:lnSpc>
+                <a:spcPct val="100000"/>
+              </a:lnSpc>
+              <a:spcBef>
+                <a:spcPts val="0"/>
+              </a:spcBef>
+              <a:spcAft>
+                <a:spcPts val="0"/>
+              </a:spcAft>
+              <a:buClr>
+                <a:schemeClr val="dk1"/>
+              </a:buClr>
+              <a:buSzPts val="1400"/>
+              <a:buFont typeface="Roboto"/>
+              <a:buNone/>
+              <a:defRPr sz="2000" b="1" i="0" u="none" strike="noStrike" cap="none">
+                <a:solidFill>
+                  <a:schemeClr val="dk1"/>
+                </a:solidFill>
+                <a:latin typeface="Oswald"/>
+                <a:ea typeface="Oswald"/>
+                <a:cs typeface="Oswald"/>
+                <a:sym typeface="Oswald"/>
+              </a:defRPr>
+            </a:lvl6pPr>
+            <a:lvl7pPr marL="3200400" marR="0" lvl="6" indent="-317500" algn="l" rtl="0">
+              <a:lnSpc>
+                <a:spcPct val="100000"/>
+              </a:lnSpc>
+              <a:spcBef>
+                <a:spcPts val="0"/>
+              </a:spcBef>
+              <a:spcAft>
+                <a:spcPts val="0"/>
+              </a:spcAft>
+              <a:buClr>
+                <a:schemeClr val="dk1"/>
+              </a:buClr>
+              <a:buSzPts val="1400"/>
+              <a:buFont typeface="Roboto"/>
+              <a:buNone/>
+              <a:defRPr sz="2000" b="1" i="0" u="none" strike="noStrike" cap="none">
+                <a:solidFill>
+                  <a:schemeClr val="dk1"/>
+                </a:solidFill>
+                <a:latin typeface="Oswald"/>
+                <a:ea typeface="Oswald"/>
+                <a:cs typeface="Oswald"/>
+                <a:sym typeface="Oswald"/>
+              </a:defRPr>
+            </a:lvl7pPr>
+            <a:lvl8pPr marL="3657600" marR="0" lvl="7" indent="-317500" algn="l" rtl="0">
+              <a:lnSpc>
+                <a:spcPct val="100000"/>
+              </a:lnSpc>
+              <a:spcBef>
+                <a:spcPts val="0"/>
+              </a:spcBef>
+              <a:spcAft>
+                <a:spcPts val="0"/>
+              </a:spcAft>
+              <a:buClr>
+                <a:schemeClr val="dk1"/>
+              </a:buClr>
+              <a:buSzPts val="1400"/>
+              <a:buFont typeface="Roboto"/>
+              <a:buNone/>
+              <a:defRPr sz="2000" b="1" i="0" u="none" strike="noStrike" cap="none">
+                <a:solidFill>
+                  <a:schemeClr val="dk1"/>
+                </a:solidFill>
+                <a:latin typeface="Oswald"/>
+                <a:ea typeface="Oswald"/>
+                <a:cs typeface="Oswald"/>
+                <a:sym typeface="Oswald"/>
+              </a:defRPr>
+            </a:lvl8pPr>
+            <a:lvl9pPr marL="4114800" marR="0" lvl="8" indent="-317500" algn="l" rtl="0">
+              <a:lnSpc>
+                <a:spcPct val="100000"/>
+              </a:lnSpc>
+              <a:spcBef>
+                <a:spcPts val="0"/>
+              </a:spcBef>
+              <a:spcAft>
+                <a:spcPts val="0"/>
+              </a:spcAft>
+              <a:buClr>
+                <a:schemeClr val="dk1"/>
+              </a:buClr>
+              <a:buSzPts val="1400"/>
+              <a:buFont typeface="Roboto"/>
+              <a:buNone/>
+              <a:defRPr sz="2000" b="1" i="0" u="none" strike="noStrike" cap="none">
+                <a:solidFill>
+                  <a:schemeClr val="dk1"/>
+                </a:solidFill>
+                <a:latin typeface="Oswald"/>
+                <a:ea typeface="Oswald"/>
+                <a:cs typeface="Oswald"/>
+                <a:sym typeface="Oswald"/>
+              </a:defRPr>
+            </a:lvl9pPr>
+          </a:lstStyle>
+          <a:p>
+            <a:pPr marL="0" indent="0"/>
+            <a:r>
+              <a:rPr lang="en-US"/>
+              <a:t>Challenges</a:t>
+            </a:r>
+          </a:p>
+        </p:txBody>
+      </p:sp>
+    </p:spTree>
+    <p:extLst>
+      <p:ext uri="{BB962C8B-B14F-4D97-AF65-F5344CB8AC3E}">
+        <p14:creationId xmlns:p14="http://schemas.microsoft.com/office/powerpoint/2010/main" val="2880234122"/>
+      </p:ext>
+    </p:extLst>
+  </p:cSld>
+  <p:clrMapOvr>
+    <a:masterClrMapping/>
+  </p:clrMapOvr>
+</p:sld>
+</file>
+
+<file path=ppt/slides/slide20.xml><?xml version="1.0" encoding="utf-8"?>
 <p:sld xmlns:a="http://schemas.openxmlformats.org/drawingml/2006/main" xmlns:r="http://schemas.openxmlformats.org/officeDocument/2006/relationships" xmlns:p="http://schemas.openxmlformats.org/presentationml/2006/main">
   <p:cSld>
     <p:spTree>
@@ -40083,1078 +41877,7 @@
 </p:sld>
 </file>
 
-<file path=ppt/slides/slide2.xml><?xml version="1.0" encoding="utf-8"?>
-<p:sld xmlns:a="http://schemas.openxmlformats.org/drawingml/2006/main" xmlns:r="http://schemas.openxmlformats.org/officeDocument/2006/relationships" xmlns:p="http://schemas.openxmlformats.org/presentationml/2006/main">
-  <p:cSld>
-    <p:spTree>
-      <p:nvGrpSpPr>
-        <p:cNvPr id="1" name="Shape 822"/>
-        <p:cNvGrpSpPr/>
-        <p:nvPr/>
-      </p:nvGrpSpPr>
-      <p:grpSpPr>
-        <a:xfrm>
-          <a:off x="0" y="0"/>
-          <a:ext cx="0" cy="0"/>
-          <a:chOff x="0" y="0"/>
-          <a:chExt cx="0" cy="0"/>
-        </a:xfrm>
-      </p:grpSpPr>
-      <p:sp>
-        <p:nvSpPr>
-          <p:cNvPr id="823" name="Google Shape;823;p42"/>
-          <p:cNvSpPr txBox="1">
-            <a:spLocks noGrp="1"/>
-          </p:cNvSpPr>
-          <p:nvPr>
-            <p:ph type="title" idx="9"/>
-          </p:nvPr>
-        </p:nvSpPr>
-        <p:spPr>
-          <a:xfrm>
-            <a:off x="720000" y="387600"/>
-            <a:ext cx="7704000" cy="612600"/>
-          </a:xfrm>
-          <a:prstGeom prst="rect">
-            <a:avLst/>
-          </a:prstGeom>
-        </p:spPr>
-        <p:txBody>
-          <a:bodyPr spcFirstLastPara="1" wrap="square" lIns="91425" tIns="91425" rIns="91425" bIns="91425" anchor="t" anchorCtr="0">
-            <a:noAutofit/>
-          </a:bodyPr>
-          <a:lstStyle/>
-          <a:p>
-            <a:pPr marL="0" lvl="0" indent="0" algn="l" rtl="0">
-              <a:spcBef>
-                <a:spcPts val="0"/>
-              </a:spcBef>
-              <a:spcAft>
-                <a:spcPts val="0"/>
-              </a:spcAft>
-              <a:buNone/>
-            </a:pPr>
-            <a:r>
-              <a:rPr lang="en"/>
-              <a:t>Agenda</a:t>
-            </a:r>
-            <a:endParaRPr/>
-          </a:p>
-        </p:txBody>
-      </p:sp>
-      <p:sp>
-        <p:nvSpPr>
-          <p:cNvPr id="824" name="Google Shape;824;p42"/>
-          <p:cNvSpPr/>
-          <p:nvPr/>
-        </p:nvSpPr>
-        <p:spPr>
-          <a:xfrm>
-            <a:off x="792926" y="1393620"/>
-            <a:ext cx="1138500" cy="1140900"/>
-          </a:xfrm>
-          <a:prstGeom prst="roundRect">
-            <a:avLst>
-              <a:gd name="adj" fmla="val 50000"/>
-            </a:avLst>
-          </a:prstGeom>
-          <a:solidFill>
-            <a:srgbClr val="FFFFFF"/>
-          </a:solidFill>
-          <a:ln>
-            <a:noFill/>
-          </a:ln>
-        </p:spPr>
-        <p:txBody>
-          <a:bodyPr spcFirstLastPara="1" wrap="square" lIns="91425" tIns="91425" rIns="91425" bIns="91425" anchor="ctr" anchorCtr="0">
-            <a:noAutofit/>
-          </a:bodyPr>
-          <a:lstStyle/>
-          <a:p>
-            <a:pPr marL="0" lvl="0" indent="0" algn="l" rtl="0">
-              <a:spcBef>
-                <a:spcPts val="0"/>
-              </a:spcBef>
-              <a:spcAft>
-                <a:spcPts val="0"/>
-              </a:spcAft>
-              <a:buNone/>
-            </a:pPr>
-            <a:endParaRPr/>
-          </a:p>
-        </p:txBody>
-      </p:sp>
-      <p:sp>
-        <p:nvSpPr>
-          <p:cNvPr id="825" name="Google Shape;825;p42"/>
-          <p:cNvSpPr/>
-          <p:nvPr/>
-        </p:nvSpPr>
-        <p:spPr>
-          <a:xfrm>
-            <a:off x="2802876" y="2615162"/>
-            <a:ext cx="1138500" cy="1140900"/>
-          </a:xfrm>
-          <a:prstGeom prst="roundRect">
-            <a:avLst>
-              <a:gd name="adj" fmla="val 50000"/>
-            </a:avLst>
-          </a:prstGeom>
-          <a:solidFill>
-            <a:srgbClr val="FFFFFF"/>
-          </a:solidFill>
-          <a:ln>
-            <a:noFill/>
-          </a:ln>
-        </p:spPr>
-        <p:txBody>
-          <a:bodyPr spcFirstLastPara="1" wrap="square" lIns="91425" tIns="91425" rIns="91425" bIns="91425" anchor="ctr" anchorCtr="0">
-            <a:noAutofit/>
-          </a:bodyPr>
-          <a:lstStyle/>
-          <a:p>
-            <a:pPr marL="0" lvl="0" indent="0" algn="l" rtl="0">
-              <a:spcBef>
-                <a:spcPts val="0"/>
-              </a:spcBef>
-              <a:spcAft>
-                <a:spcPts val="0"/>
-              </a:spcAft>
-              <a:buNone/>
-            </a:pPr>
-            <a:endParaRPr/>
-          </a:p>
-        </p:txBody>
-      </p:sp>
-      <p:sp>
-        <p:nvSpPr>
-          <p:cNvPr id="826" name="Google Shape;826;p42"/>
-          <p:cNvSpPr/>
-          <p:nvPr/>
-        </p:nvSpPr>
-        <p:spPr>
-          <a:xfrm>
-            <a:off x="5047326" y="1393620"/>
-            <a:ext cx="1138500" cy="1140900"/>
-          </a:xfrm>
-          <a:prstGeom prst="roundRect">
-            <a:avLst>
-              <a:gd name="adj" fmla="val 50000"/>
-            </a:avLst>
-          </a:prstGeom>
-          <a:solidFill>
-            <a:srgbClr val="FFFFFF"/>
-          </a:solidFill>
-          <a:ln>
-            <a:noFill/>
-          </a:ln>
-        </p:spPr>
-        <p:txBody>
-          <a:bodyPr spcFirstLastPara="1" wrap="square" lIns="91425" tIns="91425" rIns="91425" bIns="91425" anchor="ctr" anchorCtr="0">
-            <a:noAutofit/>
-          </a:bodyPr>
-          <a:lstStyle/>
-          <a:p>
-            <a:pPr marL="0" lvl="0" indent="0" algn="l" rtl="0">
-              <a:spcBef>
-                <a:spcPts val="0"/>
-              </a:spcBef>
-              <a:spcAft>
-                <a:spcPts val="0"/>
-              </a:spcAft>
-              <a:buNone/>
-            </a:pPr>
-            <a:endParaRPr/>
-          </a:p>
-        </p:txBody>
-      </p:sp>
-      <p:sp>
-        <p:nvSpPr>
-          <p:cNvPr id="827" name="Google Shape;827;p42"/>
-          <p:cNvSpPr txBox="1">
-            <a:spLocks noGrp="1"/>
-          </p:cNvSpPr>
-          <p:nvPr>
-            <p:ph type="title"/>
-          </p:nvPr>
-        </p:nvSpPr>
-        <p:spPr>
-          <a:xfrm>
-            <a:off x="919226" y="1688664"/>
-            <a:ext cx="885900" cy="650400"/>
-          </a:xfrm>
-          <a:prstGeom prst="rect">
-            <a:avLst/>
-          </a:prstGeom>
-        </p:spPr>
-        <p:txBody>
-          <a:bodyPr spcFirstLastPara="1" wrap="square" lIns="91425" tIns="91425" rIns="91425" bIns="91425" anchor="ctr" anchorCtr="0">
-            <a:noAutofit/>
-          </a:bodyPr>
-          <a:lstStyle/>
-          <a:p>
-            <a:pPr marL="0" lvl="0" indent="0" algn="ctr" rtl="0">
-              <a:spcBef>
-                <a:spcPts val="0"/>
-              </a:spcBef>
-              <a:spcAft>
-                <a:spcPts val="0"/>
-              </a:spcAft>
-              <a:buNone/>
-            </a:pPr>
-            <a:r>
-              <a:rPr lang="en"/>
-              <a:t>01</a:t>
-            </a:r>
-            <a:endParaRPr/>
-          </a:p>
-        </p:txBody>
-      </p:sp>
-      <p:sp>
-        <p:nvSpPr>
-          <p:cNvPr id="828" name="Google Shape;828;p42"/>
-          <p:cNvSpPr txBox="1">
-            <a:spLocks noGrp="1"/>
-          </p:cNvSpPr>
-          <p:nvPr>
-            <p:ph type="subTitle" idx="1"/>
-          </p:nvPr>
-        </p:nvSpPr>
-        <p:spPr>
-          <a:xfrm>
-            <a:off x="266739" y="2636943"/>
-            <a:ext cx="2181300" cy="371400"/>
-          </a:xfrm>
-          <a:prstGeom prst="rect">
-            <a:avLst/>
-          </a:prstGeom>
-        </p:spPr>
-        <p:txBody>
-          <a:bodyPr spcFirstLastPara="1" wrap="square" lIns="91425" tIns="91425" rIns="91425" bIns="91425" anchor="t" anchorCtr="0">
-            <a:noAutofit/>
-          </a:bodyPr>
-          <a:lstStyle/>
-          <a:p>
-            <a:pPr marL="0" lvl="0" indent="0" algn="ctr">
-              <a:spcBef>
-                <a:spcPts val="0"/>
-              </a:spcBef>
-              <a:spcAft>
-                <a:spcPts val="0"/>
-              </a:spcAft>
-              <a:buNone/>
-            </a:pPr>
-            <a:r>
-              <a:rPr lang="en" dirty="0"/>
-              <a:t>INTRODUCTION</a:t>
-            </a:r>
-            <a:endParaRPr lang="en-US" dirty="0"/>
-          </a:p>
-        </p:txBody>
-      </p:sp>
-      <p:sp>
-        <p:nvSpPr>
-          <p:cNvPr id="830" name="Google Shape;830;p42"/>
-          <p:cNvSpPr txBox="1">
-            <a:spLocks noGrp="1"/>
-          </p:cNvSpPr>
-          <p:nvPr>
-            <p:ph type="title" idx="3"/>
-          </p:nvPr>
-        </p:nvSpPr>
-        <p:spPr>
-          <a:xfrm>
-            <a:off x="2929176" y="2910206"/>
-            <a:ext cx="885900" cy="650400"/>
-          </a:xfrm>
-          <a:prstGeom prst="rect">
-            <a:avLst/>
-          </a:prstGeom>
-        </p:spPr>
-        <p:txBody>
-          <a:bodyPr spcFirstLastPara="1" wrap="square" lIns="91425" tIns="91425" rIns="91425" bIns="91425" anchor="ctr" anchorCtr="0">
-            <a:noAutofit/>
-          </a:bodyPr>
-          <a:lstStyle/>
-          <a:p>
-            <a:pPr marL="0" lvl="0" indent="0" algn="ctr" rtl="0">
-              <a:spcBef>
-                <a:spcPts val="0"/>
-              </a:spcBef>
-              <a:spcAft>
-                <a:spcPts val="0"/>
-              </a:spcAft>
-              <a:buNone/>
-            </a:pPr>
-            <a:r>
-              <a:rPr lang="en"/>
-              <a:t>02</a:t>
-            </a:r>
-            <a:endParaRPr/>
-          </a:p>
-        </p:txBody>
-      </p:sp>
-      <p:sp>
-        <p:nvSpPr>
-          <p:cNvPr id="831" name="Google Shape;831;p42"/>
-          <p:cNvSpPr txBox="1">
-            <a:spLocks noGrp="1"/>
-          </p:cNvSpPr>
-          <p:nvPr>
-            <p:ph type="subTitle" idx="4"/>
-          </p:nvPr>
-        </p:nvSpPr>
-        <p:spPr>
-          <a:xfrm>
-            <a:off x="2281476" y="3858485"/>
-            <a:ext cx="2181300" cy="371400"/>
-          </a:xfrm>
-          <a:prstGeom prst="rect">
-            <a:avLst/>
-          </a:prstGeom>
-        </p:spPr>
-        <p:txBody>
-          <a:bodyPr spcFirstLastPara="1" wrap="square" lIns="91425" tIns="91425" rIns="91425" bIns="91425" anchor="t" anchorCtr="0">
-            <a:noAutofit/>
-          </a:bodyPr>
-          <a:lstStyle/>
-          <a:p>
-            <a:pPr marL="0" lvl="0" indent="0" algn="ctr" rtl="0">
-              <a:spcBef>
-                <a:spcPts val="0"/>
-              </a:spcBef>
-              <a:spcAft>
-                <a:spcPts val="0"/>
-              </a:spcAft>
-              <a:buNone/>
-            </a:pPr>
-            <a:r>
-              <a:rPr lang="en"/>
-              <a:t>Solution</a:t>
-            </a:r>
-            <a:endParaRPr/>
-          </a:p>
-        </p:txBody>
-      </p:sp>
-      <p:sp>
-        <p:nvSpPr>
-          <p:cNvPr id="833" name="Google Shape;833;p42"/>
-          <p:cNvSpPr txBox="1">
-            <a:spLocks noGrp="1"/>
-          </p:cNvSpPr>
-          <p:nvPr>
-            <p:ph type="title" idx="6"/>
-          </p:nvPr>
-        </p:nvSpPr>
-        <p:spPr>
-          <a:xfrm>
-            <a:off x="5173626" y="1688664"/>
-            <a:ext cx="885900" cy="650400"/>
-          </a:xfrm>
-          <a:prstGeom prst="rect">
-            <a:avLst/>
-          </a:prstGeom>
-        </p:spPr>
-        <p:txBody>
-          <a:bodyPr spcFirstLastPara="1" wrap="square" lIns="91425" tIns="91425" rIns="91425" bIns="91425" anchor="ctr" anchorCtr="0">
-            <a:noAutofit/>
-          </a:bodyPr>
-          <a:lstStyle/>
-          <a:p>
-            <a:pPr marL="0" lvl="0" indent="0" algn="ctr" rtl="0">
-              <a:spcBef>
-                <a:spcPts val="0"/>
-              </a:spcBef>
-              <a:spcAft>
-                <a:spcPts val="0"/>
-              </a:spcAft>
-              <a:buNone/>
-            </a:pPr>
-            <a:r>
-              <a:rPr lang="en"/>
-              <a:t>03</a:t>
-            </a:r>
-            <a:endParaRPr/>
-          </a:p>
-        </p:txBody>
-      </p:sp>
-      <p:sp>
-        <p:nvSpPr>
-          <p:cNvPr id="834" name="Google Shape;834;p42"/>
-          <p:cNvSpPr txBox="1">
-            <a:spLocks noGrp="1"/>
-          </p:cNvSpPr>
-          <p:nvPr>
-            <p:ph type="subTitle" idx="7"/>
-          </p:nvPr>
-        </p:nvSpPr>
-        <p:spPr>
-          <a:xfrm>
-            <a:off x="4525926" y="2636943"/>
-            <a:ext cx="2181300" cy="371400"/>
-          </a:xfrm>
-          <a:prstGeom prst="rect">
-            <a:avLst/>
-          </a:prstGeom>
-        </p:spPr>
-        <p:txBody>
-          <a:bodyPr spcFirstLastPara="1" wrap="square" lIns="91425" tIns="91425" rIns="91425" bIns="91425" anchor="t" anchorCtr="0">
-            <a:noAutofit/>
-          </a:bodyPr>
-          <a:lstStyle/>
-          <a:p>
-            <a:pPr marL="0" lvl="0" indent="0" algn="ctr" rtl="0">
-              <a:spcBef>
-                <a:spcPts val="0"/>
-              </a:spcBef>
-              <a:spcAft>
-                <a:spcPts val="0"/>
-              </a:spcAft>
-              <a:buNone/>
-            </a:pPr>
-            <a:r>
-              <a:rPr lang="en"/>
-              <a:t>Model Architecture</a:t>
-            </a:r>
-            <a:endParaRPr/>
-          </a:p>
-        </p:txBody>
-      </p:sp>
-      <p:sp>
-        <p:nvSpPr>
-          <p:cNvPr id="2" name="Google Shape;826;p42">
-            <a:extLst>
-              <a:ext uri="{FF2B5EF4-FFF2-40B4-BE49-F238E27FC236}">
-                <a16:creationId xmlns:a16="http://schemas.microsoft.com/office/drawing/2014/main" id="{82CC75F4-CD25-8500-942F-1C588B1297BF}"/>
-              </a:ext>
-            </a:extLst>
-          </p:cNvPr>
-          <p:cNvSpPr/>
-          <p:nvPr/>
-        </p:nvSpPr>
-        <p:spPr>
-          <a:xfrm>
-            <a:off x="7275645" y="2615162"/>
-            <a:ext cx="1138500" cy="1140900"/>
-          </a:xfrm>
-          <a:prstGeom prst="roundRect">
-            <a:avLst>
-              <a:gd name="adj" fmla="val 50000"/>
-            </a:avLst>
-          </a:prstGeom>
-          <a:solidFill>
-            <a:srgbClr val="FFFFFF"/>
-          </a:solidFill>
-          <a:ln>
-            <a:noFill/>
-          </a:ln>
-        </p:spPr>
-        <p:txBody>
-          <a:bodyPr spcFirstLastPara="1" wrap="square" lIns="91425" tIns="91425" rIns="91425" bIns="91425" anchor="ctr" anchorCtr="0">
-            <a:noAutofit/>
-          </a:bodyPr>
-          <a:lstStyle/>
-          <a:p>
-            <a:pPr marL="0" lvl="0" indent="0" algn="l" rtl="0">
-              <a:spcBef>
-                <a:spcPts val="0"/>
-              </a:spcBef>
-              <a:spcAft>
-                <a:spcPts val="0"/>
-              </a:spcAft>
-              <a:buNone/>
-            </a:pPr>
-            <a:endParaRPr/>
-          </a:p>
-        </p:txBody>
-      </p:sp>
-      <p:sp>
-        <p:nvSpPr>
-          <p:cNvPr id="3" name="Google Shape;833;p42">
-            <a:extLst>
-              <a:ext uri="{FF2B5EF4-FFF2-40B4-BE49-F238E27FC236}">
-                <a16:creationId xmlns:a16="http://schemas.microsoft.com/office/drawing/2014/main" id="{D0D54B40-9489-7139-08C8-6D9710DE1F48}"/>
-              </a:ext>
-            </a:extLst>
-          </p:cNvPr>
-          <p:cNvSpPr txBox="1">
-            <a:spLocks/>
-          </p:cNvSpPr>
-          <p:nvPr/>
-        </p:nvSpPr>
-        <p:spPr>
-          <a:xfrm>
-            <a:off x="7401945" y="2910206"/>
-            <a:ext cx="885900" cy="650400"/>
-          </a:xfrm>
-          <a:prstGeom prst="rect">
-            <a:avLst/>
-          </a:prstGeom>
-          <a:noFill/>
-          <a:ln>
-            <a:noFill/>
-          </a:ln>
-        </p:spPr>
-        <p:txBody>
-          <a:bodyPr spcFirstLastPara="1" wrap="square" lIns="91425" tIns="91425" rIns="91425" bIns="91425" anchor="ctr" anchorCtr="0">
-            <a:noAutofit/>
-          </a:bodyPr>
-          <a:lstStyle>
-            <a:defPPr marR="0" lvl="0" algn="l" rtl="0">
-              <a:lnSpc>
-                <a:spcPct val="100000"/>
-              </a:lnSpc>
-              <a:spcBef>
-                <a:spcPts val="0"/>
-              </a:spcBef>
-              <a:spcAft>
-                <a:spcPts val="0"/>
-              </a:spcAft>
-            </a:defPPr>
-            <a:lvl1pPr marR="0" lvl="0" algn="ctr" rtl="0">
-              <a:lnSpc>
-                <a:spcPct val="100000"/>
-              </a:lnSpc>
-              <a:spcBef>
-                <a:spcPts val="0"/>
-              </a:spcBef>
-              <a:spcAft>
-                <a:spcPts val="0"/>
-              </a:spcAft>
-              <a:buClr>
-                <a:schemeClr val="dk1"/>
-              </a:buClr>
-              <a:buSzPts val="4800"/>
-              <a:buFont typeface="Oswald"/>
-              <a:buNone/>
-              <a:defRPr sz="4800" b="1" i="0" u="none" strike="noStrike" cap="none">
-                <a:solidFill>
-                  <a:schemeClr val="dk1"/>
-                </a:solidFill>
-                <a:latin typeface="Oswald"/>
-                <a:ea typeface="Oswald"/>
-                <a:cs typeface="Oswald"/>
-                <a:sym typeface="Oswald"/>
-              </a:defRPr>
-            </a:lvl1pPr>
-            <a:lvl2pPr marR="0" lvl="1" algn="ctr" rtl="0">
-              <a:lnSpc>
-                <a:spcPct val="100000"/>
-              </a:lnSpc>
-              <a:spcBef>
-                <a:spcPts val="0"/>
-              </a:spcBef>
-              <a:spcAft>
-                <a:spcPts val="0"/>
-              </a:spcAft>
-              <a:buClr>
-                <a:schemeClr val="dk1"/>
-              </a:buClr>
-              <a:buSzPts val="4800"/>
-              <a:buFont typeface="Oswald"/>
-              <a:buNone/>
-              <a:defRPr sz="4800" b="0" i="0" u="none" strike="noStrike" cap="none">
-                <a:solidFill>
-                  <a:schemeClr val="dk1"/>
-                </a:solidFill>
-                <a:latin typeface="Oswald"/>
-                <a:ea typeface="Oswald"/>
-                <a:cs typeface="Oswald"/>
-                <a:sym typeface="Oswald"/>
-              </a:defRPr>
-            </a:lvl2pPr>
-            <a:lvl3pPr marR="0" lvl="2" algn="ctr" rtl="0">
-              <a:lnSpc>
-                <a:spcPct val="100000"/>
-              </a:lnSpc>
-              <a:spcBef>
-                <a:spcPts val="0"/>
-              </a:spcBef>
-              <a:spcAft>
-                <a:spcPts val="0"/>
-              </a:spcAft>
-              <a:buClr>
-                <a:schemeClr val="dk1"/>
-              </a:buClr>
-              <a:buSzPts val="4800"/>
-              <a:buFont typeface="Oswald"/>
-              <a:buNone/>
-              <a:defRPr sz="4800" b="0" i="0" u="none" strike="noStrike" cap="none">
-                <a:solidFill>
-                  <a:schemeClr val="dk1"/>
-                </a:solidFill>
-                <a:latin typeface="Oswald"/>
-                <a:ea typeface="Oswald"/>
-                <a:cs typeface="Oswald"/>
-                <a:sym typeface="Oswald"/>
-              </a:defRPr>
-            </a:lvl3pPr>
-            <a:lvl4pPr marR="0" lvl="3" algn="ctr" rtl="0">
-              <a:lnSpc>
-                <a:spcPct val="100000"/>
-              </a:lnSpc>
-              <a:spcBef>
-                <a:spcPts val="0"/>
-              </a:spcBef>
-              <a:spcAft>
-                <a:spcPts val="0"/>
-              </a:spcAft>
-              <a:buClr>
-                <a:schemeClr val="dk1"/>
-              </a:buClr>
-              <a:buSzPts val="4800"/>
-              <a:buFont typeface="Oswald"/>
-              <a:buNone/>
-              <a:defRPr sz="4800" b="0" i="0" u="none" strike="noStrike" cap="none">
-                <a:solidFill>
-                  <a:schemeClr val="dk1"/>
-                </a:solidFill>
-                <a:latin typeface="Oswald"/>
-                <a:ea typeface="Oswald"/>
-                <a:cs typeface="Oswald"/>
-                <a:sym typeface="Oswald"/>
-              </a:defRPr>
-            </a:lvl4pPr>
-            <a:lvl5pPr marR="0" lvl="4" algn="ctr" rtl="0">
-              <a:lnSpc>
-                <a:spcPct val="100000"/>
-              </a:lnSpc>
-              <a:spcBef>
-                <a:spcPts val="0"/>
-              </a:spcBef>
-              <a:spcAft>
-                <a:spcPts val="0"/>
-              </a:spcAft>
-              <a:buClr>
-                <a:schemeClr val="dk1"/>
-              </a:buClr>
-              <a:buSzPts val="4800"/>
-              <a:buFont typeface="Oswald"/>
-              <a:buNone/>
-              <a:defRPr sz="4800" b="0" i="0" u="none" strike="noStrike" cap="none">
-                <a:solidFill>
-                  <a:schemeClr val="dk1"/>
-                </a:solidFill>
-                <a:latin typeface="Oswald"/>
-                <a:ea typeface="Oswald"/>
-                <a:cs typeface="Oswald"/>
-                <a:sym typeface="Oswald"/>
-              </a:defRPr>
-            </a:lvl5pPr>
-            <a:lvl6pPr marR="0" lvl="5" algn="ctr" rtl="0">
-              <a:lnSpc>
-                <a:spcPct val="100000"/>
-              </a:lnSpc>
-              <a:spcBef>
-                <a:spcPts val="0"/>
-              </a:spcBef>
-              <a:spcAft>
-                <a:spcPts val="0"/>
-              </a:spcAft>
-              <a:buClr>
-                <a:schemeClr val="dk1"/>
-              </a:buClr>
-              <a:buSzPts val="4800"/>
-              <a:buFont typeface="Oswald"/>
-              <a:buNone/>
-              <a:defRPr sz="4800" b="0" i="0" u="none" strike="noStrike" cap="none">
-                <a:solidFill>
-                  <a:schemeClr val="dk1"/>
-                </a:solidFill>
-                <a:latin typeface="Oswald"/>
-                <a:ea typeface="Oswald"/>
-                <a:cs typeface="Oswald"/>
-                <a:sym typeface="Oswald"/>
-              </a:defRPr>
-            </a:lvl6pPr>
-            <a:lvl7pPr marR="0" lvl="6" algn="ctr" rtl="0">
-              <a:lnSpc>
-                <a:spcPct val="100000"/>
-              </a:lnSpc>
-              <a:spcBef>
-                <a:spcPts val="0"/>
-              </a:spcBef>
-              <a:spcAft>
-                <a:spcPts val="0"/>
-              </a:spcAft>
-              <a:buClr>
-                <a:schemeClr val="dk1"/>
-              </a:buClr>
-              <a:buSzPts val="4800"/>
-              <a:buFont typeface="Oswald"/>
-              <a:buNone/>
-              <a:defRPr sz="4800" b="0" i="0" u="none" strike="noStrike" cap="none">
-                <a:solidFill>
-                  <a:schemeClr val="dk1"/>
-                </a:solidFill>
-                <a:latin typeface="Oswald"/>
-                <a:ea typeface="Oswald"/>
-                <a:cs typeface="Oswald"/>
-                <a:sym typeface="Oswald"/>
-              </a:defRPr>
-            </a:lvl7pPr>
-            <a:lvl8pPr marR="0" lvl="7" algn="ctr" rtl="0">
-              <a:lnSpc>
-                <a:spcPct val="100000"/>
-              </a:lnSpc>
-              <a:spcBef>
-                <a:spcPts val="0"/>
-              </a:spcBef>
-              <a:spcAft>
-                <a:spcPts val="0"/>
-              </a:spcAft>
-              <a:buClr>
-                <a:schemeClr val="dk1"/>
-              </a:buClr>
-              <a:buSzPts val="4800"/>
-              <a:buFont typeface="Oswald"/>
-              <a:buNone/>
-              <a:defRPr sz="4800" b="0" i="0" u="none" strike="noStrike" cap="none">
-                <a:solidFill>
-                  <a:schemeClr val="dk1"/>
-                </a:solidFill>
-                <a:latin typeface="Oswald"/>
-                <a:ea typeface="Oswald"/>
-                <a:cs typeface="Oswald"/>
-                <a:sym typeface="Oswald"/>
-              </a:defRPr>
-            </a:lvl8pPr>
-            <a:lvl9pPr marR="0" lvl="8" algn="ctr" rtl="0">
-              <a:lnSpc>
-                <a:spcPct val="100000"/>
-              </a:lnSpc>
-              <a:spcBef>
-                <a:spcPts val="0"/>
-              </a:spcBef>
-              <a:spcAft>
-                <a:spcPts val="0"/>
-              </a:spcAft>
-              <a:buClr>
-                <a:schemeClr val="dk1"/>
-              </a:buClr>
-              <a:buSzPts val="4800"/>
-              <a:buFont typeface="Oswald"/>
-              <a:buNone/>
-              <a:defRPr sz="4800" b="0" i="0" u="none" strike="noStrike" cap="none">
-                <a:solidFill>
-                  <a:schemeClr val="dk1"/>
-                </a:solidFill>
-                <a:latin typeface="Oswald"/>
-                <a:ea typeface="Oswald"/>
-                <a:cs typeface="Oswald"/>
-                <a:sym typeface="Oswald"/>
-              </a:defRPr>
-            </a:lvl9pPr>
-          </a:lstStyle>
-          <a:p>
-            <a:r>
-              <a:rPr lang="en"/>
-              <a:t>04</a:t>
-            </a:r>
-          </a:p>
-        </p:txBody>
-      </p:sp>
-      <p:sp>
-        <p:nvSpPr>
-          <p:cNvPr id="4" name="Google Shape;834;p42">
-            <a:extLst>
-              <a:ext uri="{FF2B5EF4-FFF2-40B4-BE49-F238E27FC236}">
-                <a16:creationId xmlns:a16="http://schemas.microsoft.com/office/drawing/2014/main" id="{A9AD694E-5FC3-F507-FF2E-33CF891743C4}"/>
-              </a:ext>
-            </a:extLst>
-          </p:cNvPr>
-          <p:cNvSpPr txBox="1">
-            <a:spLocks/>
-          </p:cNvSpPr>
-          <p:nvPr/>
-        </p:nvSpPr>
-        <p:spPr>
-          <a:xfrm>
-            <a:off x="6754245" y="3858485"/>
-            <a:ext cx="2181300" cy="371400"/>
-          </a:xfrm>
-          <a:prstGeom prst="rect">
-            <a:avLst/>
-          </a:prstGeom>
-          <a:noFill/>
-          <a:ln>
-            <a:noFill/>
-          </a:ln>
-        </p:spPr>
-        <p:txBody>
-          <a:bodyPr spcFirstLastPara="1" wrap="square" lIns="91425" tIns="91425" rIns="91425" bIns="91425" anchor="t" anchorCtr="0">
-            <a:noAutofit/>
-          </a:bodyPr>
-          <a:lstStyle>
-            <a:defPPr marR="0" lvl="0" algn="l" rtl="0">
-              <a:lnSpc>
-                <a:spcPct val="100000"/>
-              </a:lnSpc>
-              <a:spcBef>
-                <a:spcPts val="0"/>
-              </a:spcBef>
-              <a:spcAft>
-                <a:spcPts val="0"/>
-              </a:spcAft>
-            </a:defPPr>
-            <a:lvl1pPr marL="457200" marR="0" lvl="0" indent="-342900" algn="ctr" rtl="0">
-              <a:lnSpc>
-                <a:spcPct val="100000"/>
-              </a:lnSpc>
-              <a:spcBef>
-                <a:spcPts val="0"/>
-              </a:spcBef>
-              <a:spcAft>
-                <a:spcPts val="0"/>
-              </a:spcAft>
-              <a:buClr>
-                <a:schemeClr val="dk1"/>
-              </a:buClr>
-              <a:buSzPts val="1800"/>
-              <a:buFont typeface="Roboto"/>
-              <a:buNone/>
-              <a:defRPr sz="2000" b="1" i="0" u="none" strike="noStrike" cap="none">
-                <a:solidFill>
-                  <a:schemeClr val="dk1"/>
-                </a:solidFill>
-                <a:latin typeface="Oswald"/>
-                <a:ea typeface="Oswald"/>
-                <a:cs typeface="Oswald"/>
-                <a:sym typeface="Oswald"/>
-              </a:defRPr>
-            </a:lvl1pPr>
-            <a:lvl2pPr marL="914400" marR="0" lvl="1" indent="-317500" algn="l" rtl="0">
-              <a:lnSpc>
-                <a:spcPct val="100000"/>
-              </a:lnSpc>
-              <a:spcBef>
-                <a:spcPts val="0"/>
-              </a:spcBef>
-              <a:spcAft>
-                <a:spcPts val="0"/>
-              </a:spcAft>
-              <a:buClr>
-                <a:schemeClr val="dk1"/>
-              </a:buClr>
-              <a:buSzPts val="1400"/>
-              <a:buFont typeface="Roboto"/>
-              <a:buNone/>
-              <a:defRPr sz="2000" b="1" i="0" u="none" strike="noStrike" cap="none">
-                <a:solidFill>
-                  <a:schemeClr val="dk1"/>
-                </a:solidFill>
-                <a:latin typeface="Oswald"/>
-                <a:ea typeface="Oswald"/>
-                <a:cs typeface="Oswald"/>
-                <a:sym typeface="Oswald"/>
-              </a:defRPr>
-            </a:lvl2pPr>
-            <a:lvl3pPr marL="1371600" marR="0" lvl="2" indent="-317500" algn="l" rtl="0">
-              <a:lnSpc>
-                <a:spcPct val="100000"/>
-              </a:lnSpc>
-              <a:spcBef>
-                <a:spcPts val="0"/>
-              </a:spcBef>
-              <a:spcAft>
-                <a:spcPts val="0"/>
-              </a:spcAft>
-              <a:buClr>
-                <a:schemeClr val="dk1"/>
-              </a:buClr>
-              <a:buSzPts val="1400"/>
-              <a:buFont typeface="Roboto"/>
-              <a:buNone/>
-              <a:defRPr sz="2000" b="1" i="0" u="none" strike="noStrike" cap="none">
-                <a:solidFill>
-                  <a:schemeClr val="dk1"/>
-                </a:solidFill>
-                <a:latin typeface="Oswald"/>
-                <a:ea typeface="Oswald"/>
-                <a:cs typeface="Oswald"/>
-                <a:sym typeface="Oswald"/>
-              </a:defRPr>
-            </a:lvl3pPr>
-            <a:lvl4pPr marL="1828800" marR="0" lvl="3" indent="-317500" algn="l" rtl="0">
-              <a:lnSpc>
-                <a:spcPct val="100000"/>
-              </a:lnSpc>
-              <a:spcBef>
-                <a:spcPts val="0"/>
-              </a:spcBef>
-              <a:spcAft>
-                <a:spcPts val="0"/>
-              </a:spcAft>
-              <a:buClr>
-                <a:schemeClr val="dk1"/>
-              </a:buClr>
-              <a:buSzPts val="1400"/>
-              <a:buFont typeface="Roboto"/>
-              <a:buNone/>
-              <a:defRPr sz="2000" b="1" i="0" u="none" strike="noStrike" cap="none">
-                <a:solidFill>
-                  <a:schemeClr val="dk1"/>
-                </a:solidFill>
-                <a:latin typeface="Oswald"/>
-                <a:ea typeface="Oswald"/>
-                <a:cs typeface="Oswald"/>
-                <a:sym typeface="Oswald"/>
-              </a:defRPr>
-            </a:lvl4pPr>
-            <a:lvl5pPr marL="2286000" marR="0" lvl="4" indent="-317500" algn="l" rtl="0">
-              <a:lnSpc>
-                <a:spcPct val="100000"/>
-              </a:lnSpc>
-              <a:spcBef>
-                <a:spcPts val="0"/>
-              </a:spcBef>
-              <a:spcAft>
-                <a:spcPts val="0"/>
-              </a:spcAft>
-              <a:buClr>
-                <a:schemeClr val="dk1"/>
-              </a:buClr>
-              <a:buSzPts val="1400"/>
-              <a:buFont typeface="Roboto"/>
-              <a:buNone/>
-              <a:defRPr sz="2000" b="1" i="0" u="none" strike="noStrike" cap="none">
-                <a:solidFill>
-                  <a:schemeClr val="dk1"/>
-                </a:solidFill>
-                <a:latin typeface="Oswald"/>
-                <a:ea typeface="Oswald"/>
-                <a:cs typeface="Oswald"/>
-                <a:sym typeface="Oswald"/>
-              </a:defRPr>
-            </a:lvl5pPr>
-            <a:lvl6pPr marL="2743200" marR="0" lvl="5" indent="-317500" algn="l" rtl="0">
-              <a:lnSpc>
-                <a:spcPct val="100000"/>
-              </a:lnSpc>
-              <a:spcBef>
-                <a:spcPts val="0"/>
-              </a:spcBef>
-              <a:spcAft>
-                <a:spcPts val="0"/>
-              </a:spcAft>
-              <a:buClr>
-                <a:schemeClr val="dk1"/>
-              </a:buClr>
-              <a:buSzPts val="1400"/>
-              <a:buFont typeface="Roboto"/>
-              <a:buNone/>
-              <a:defRPr sz="2000" b="1" i="0" u="none" strike="noStrike" cap="none">
-                <a:solidFill>
-                  <a:schemeClr val="dk1"/>
-                </a:solidFill>
-                <a:latin typeface="Oswald"/>
-                <a:ea typeface="Oswald"/>
-                <a:cs typeface="Oswald"/>
-                <a:sym typeface="Oswald"/>
-              </a:defRPr>
-            </a:lvl6pPr>
-            <a:lvl7pPr marL="3200400" marR="0" lvl="6" indent="-317500" algn="l" rtl="0">
-              <a:lnSpc>
-                <a:spcPct val="100000"/>
-              </a:lnSpc>
-              <a:spcBef>
-                <a:spcPts val="0"/>
-              </a:spcBef>
-              <a:spcAft>
-                <a:spcPts val="0"/>
-              </a:spcAft>
-              <a:buClr>
-                <a:schemeClr val="dk1"/>
-              </a:buClr>
-              <a:buSzPts val="1400"/>
-              <a:buFont typeface="Roboto"/>
-              <a:buNone/>
-              <a:defRPr sz="2000" b="1" i="0" u="none" strike="noStrike" cap="none">
-                <a:solidFill>
-                  <a:schemeClr val="dk1"/>
-                </a:solidFill>
-                <a:latin typeface="Oswald"/>
-                <a:ea typeface="Oswald"/>
-                <a:cs typeface="Oswald"/>
-                <a:sym typeface="Oswald"/>
-              </a:defRPr>
-            </a:lvl7pPr>
-            <a:lvl8pPr marL="3657600" marR="0" lvl="7" indent="-317500" algn="l" rtl="0">
-              <a:lnSpc>
-                <a:spcPct val="100000"/>
-              </a:lnSpc>
-              <a:spcBef>
-                <a:spcPts val="0"/>
-              </a:spcBef>
-              <a:spcAft>
-                <a:spcPts val="0"/>
-              </a:spcAft>
-              <a:buClr>
-                <a:schemeClr val="dk1"/>
-              </a:buClr>
-              <a:buSzPts val="1400"/>
-              <a:buFont typeface="Roboto"/>
-              <a:buNone/>
-              <a:defRPr sz="2000" b="1" i="0" u="none" strike="noStrike" cap="none">
-                <a:solidFill>
-                  <a:schemeClr val="dk1"/>
-                </a:solidFill>
-                <a:latin typeface="Oswald"/>
-                <a:ea typeface="Oswald"/>
-                <a:cs typeface="Oswald"/>
-                <a:sym typeface="Oswald"/>
-              </a:defRPr>
-            </a:lvl8pPr>
-            <a:lvl9pPr marL="4114800" marR="0" lvl="8" indent="-317500" algn="l" rtl="0">
-              <a:lnSpc>
-                <a:spcPct val="100000"/>
-              </a:lnSpc>
-              <a:spcBef>
-                <a:spcPts val="0"/>
-              </a:spcBef>
-              <a:spcAft>
-                <a:spcPts val="0"/>
-              </a:spcAft>
-              <a:buClr>
-                <a:schemeClr val="dk1"/>
-              </a:buClr>
-              <a:buSzPts val="1400"/>
-              <a:buFont typeface="Roboto"/>
-              <a:buNone/>
-              <a:defRPr sz="2000" b="1" i="0" u="none" strike="noStrike" cap="none">
-                <a:solidFill>
-                  <a:schemeClr val="dk1"/>
-                </a:solidFill>
-                <a:latin typeface="Oswald"/>
-                <a:ea typeface="Oswald"/>
-                <a:cs typeface="Oswald"/>
-                <a:sym typeface="Oswald"/>
-              </a:defRPr>
-            </a:lvl9pPr>
-          </a:lstStyle>
-          <a:p>
-            <a:pPr marL="0" indent="0"/>
-            <a:r>
-              <a:rPr lang="en-US"/>
-              <a:t>Challenges</a:t>
-            </a:r>
-          </a:p>
-        </p:txBody>
-      </p:sp>
-    </p:spTree>
-    <p:extLst>
-      <p:ext uri="{BB962C8B-B14F-4D97-AF65-F5344CB8AC3E}">
-        <p14:creationId xmlns:p14="http://schemas.microsoft.com/office/powerpoint/2010/main" val="2880234122"/>
-      </p:ext>
-    </p:extLst>
-  </p:cSld>
-  <p:clrMapOvr>
-    <a:masterClrMapping/>
-  </p:clrMapOvr>
-</p:sld>
-</file>
-
-<file path=ppt/slides/slide20.xml><?xml version="1.0" encoding="utf-8"?>
+<file path=ppt/slides/slide21.xml><?xml version="1.0" encoding="utf-8"?>
 <p:sld xmlns:a="http://schemas.openxmlformats.org/drawingml/2006/main" xmlns:r="http://schemas.openxmlformats.org/officeDocument/2006/relationships" xmlns:p="http://schemas.openxmlformats.org/presentationml/2006/main">
   <p:cSld>
     <p:spTree>
@@ -42712,7 +43435,7 @@
 </p:sld>
 </file>
 
-<file path=ppt/slides/slide21.xml><?xml version="1.0" encoding="utf-8"?>
+<file path=ppt/slides/slide22.xml><?xml version="1.0" encoding="utf-8"?>
 <p:sld xmlns:a="http://schemas.openxmlformats.org/drawingml/2006/main" xmlns:r="http://schemas.openxmlformats.org/officeDocument/2006/relationships" xmlns:p="http://schemas.openxmlformats.org/presentationml/2006/main">
   <p:cSld>
     <p:spTree>
@@ -43124,7 +43847,7 @@
 </p:sld>
 </file>
 
-<file path=ppt/slides/slide22.xml><?xml version="1.0" encoding="utf-8"?>
+<file path=ppt/slides/slide23.xml><?xml version="1.0" encoding="utf-8"?>
 <p:sld xmlns:a="http://schemas.openxmlformats.org/drawingml/2006/main" xmlns:r="http://schemas.openxmlformats.org/officeDocument/2006/relationships" xmlns:p="http://schemas.openxmlformats.org/presentationml/2006/main">
   <p:cSld>
     <p:spTree>

</xml_diff>